<commit_message>
Final update prior to presentation
</commit_message>
<xml_diff>
--- a/_PRESENTATION/healthcare_cost_consitency5.pptx
+++ b/_PRESENTATION/healthcare_cost_consitency5.pptx
@@ -5,10 +5,10 @@
     <p:sldMasterId id="2147483696" r:id="rId4"/>
   </p:sldMasterIdLst>
   <p:notesMasterIdLst>
-    <p:notesMasterId r:id="rId31"/>
+    <p:notesMasterId r:id="rId29"/>
   </p:notesMasterIdLst>
   <p:handoutMasterIdLst>
-    <p:handoutMasterId r:id="rId32"/>
+    <p:handoutMasterId r:id="rId30"/>
   </p:handoutMasterIdLst>
   <p:sldIdLst>
     <p:sldId id="257" r:id="rId5"/>
@@ -18,13 +18,13 @@
     <p:sldId id="280" r:id="rId9"/>
     <p:sldId id="259" r:id="rId10"/>
     <p:sldId id="278" r:id="rId11"/>
-    <p:sldId id="277" r:id="rId12"/>
-    <p:sldId id="260" r:id="rId13"/>
-    <p:sldId id="282" r:id="rId14"/>
-    <p:sldId id="283" r:id="rId15"/>
-    <p:sldId id="262" r:id="rId16"/>
-    <p:sldId id="264" r:id="rId17"/>
-    <p:sldId id="281" r:id="rId18"/>
+    <p:sldId id="282" r:id="rId12"/>
+    <p:sldId id="277" r:id="rId13"/>
+    <p:sldId id="260" r:id="rId14"/>
+    <p:sldId id="262" r:id="rId15"/>
+    <p:sldId id="264" r:id="rId16"/>
+    <p:sldId id="281" r:id="rId17"/>
+    <p:sldId id="284" r:id="rId18"/>
     <p:sldId id="265" r:id="rId19"/>
     <p:sldId id="273" r:id="rId20"/>
     <p:sldId id="274" r:id="rId21"/>
@@ -32,11 +32,9 @@
     <p:sldId id="275" r:id="rId23"/>
     <p:sldId id="276" r:id="rId24"/>
     <p:sldId id="269" r:id="rId25"/>
-    <p:sldId id="267" r:id="rId26"/>
-    <p:sldId id="268" r:id="rId27"/>
-    <p:sldId id="270" r:id="rId28"/>
-    <p:sldId id="271" r:id="rId29"/>
-    <p:sldId id="272" r:id="rId30"/>
+    <p:sldId id="285" r:id="rId26"/>
+    <p:sldId id="271" r:id="rId27"/>
+    <p:sldId id="272" r:id="rId28"/>
   </p:sldIdLst>
   <p:sldSz cx="12192000" cy="6858000"/>
   <p:notesSz cx="6858000" cy="9144000"/>
@@ -228,7 +226,7 @@
           <a:p>
             <a:fld id="{E4560B6B-963E-45AD-B18D-9DA3469D83C9}" type="datetimeFigureOut">
               <a:rPr lang="en-US" smtClean="0"/>
-              <a:t>9/9/2019</a:t>
+              <a:t>9/10/2019</a:t>
             </a:fld>
             <a:endParaRPr lang="en-US"/>
           </a:p>
@@ -393,7 +391,7 @@
           <a:p>
             <a:fld id="{428D2A0D-6B45-4215-8A49-D14849101A69}" type="datetimeFigureOut">
               <a:rPr lang="en-US" smtClean="0"/>
-              <a:t>9/9/2019</a:t>
+              <a:t>9/10/2019</a:t>
             </a:fld>
             <a:endParaRPr lang="en-US"/>
           </a:p>
@@ -809,7 +807,7 @@
           <a:p>
             <a:fld id="{96E6A182-AF03-4CC8-94DC-C0726DF52A64}" type="slidenum">
               <a:rPr lang="en-US" smtClean="0"/>
-              <a:t>12</a:t>
+              <a:t>11</a:t>
             </a:fld>
             <a:endParaRPr lang="en-US"/>
           </a:p>
@@ -862,7 +860,7 @@
           <a:p>
             <a:fld id="{8AE1E626-6EB7-4D9A-AD4A-B54D1684CAD1}" type="datetime1">
               <a:rPr lang="en-US" smtClean="0"/>
-              <a:t>9/9/2019</a:t>
+              <a:t>9/10/2019</a:t>
             </a:fld>
             <a:endParaRPr lang="en-US"/>
           </a:p>
@@ -1086,7 +1084,7 @@
           <a:p>
             <a:fld id="{59932EDF-E99E-4C68-AFCB-7A835B309D6D}" type="datetime1">
               <a:rPr lang="en-US" smtClean="0"/>
-              <a:t>9/9/2019</a:t>
+              <a:t>9/10/2019</a:t>
             </a:fld>
             <a:endParaRPr lang="en-US"/>
           </a:p>
@@ -1268,7 +1266,7 @@
           <a:p>
             <a:fld id="{5F82D85F-A551-4C69-800A-8CFFA2306A88}" type="datetime1">
               <a:rPr lang="en-US" smtClean="0"/>
-              <a:t>9/9/2019</a:t>
+              <a:t>9/10/2019</a:t>
             </a:fld>
             <a:endParaRPr lang="en-US"/>
           </a:p>
@@ -1459,7 +1457,7 @@
           <a:p>
             <a:fld id="{3BD24A36-10EA-4DE5-9251-C62AA44714D2}" type="datetime1">
               <a:rPr lang="en-US" smtClean="0"/>
-              <a:t>9/9/2019</a:t>
+              <a:t>9/10/2019</a:t>
             </a:fld>
             <a:endParaRPr lang="en-US"/>
           </a:p>
@@ -1640,7 +1638,7 @@
           <a:p>
             <a:fld id="{45E95A85-13CC-45EA-B1A6-5B8E77AB646B}" type="datetime1">
               <a:rPr lang="en-US" smtClean="0"/>
-              <a:t>9/9/2019</a:t>
+              <a:t>9/10/2019</a:t>
             </a:fld>
             <a:endParaRPr lang="en-US"/>
           </a:p>
@@ -1889,7 +1887,7 @@
           <a:p>
             <a:fld id="{34B71815-F531-4787-BA2A-626422C133AD}" type="datetime1">
               <a:rPr lang="en-US" smtClean="0"/>
-              <a:t>9/9/2019</a:t>
+              <a:t>9/10/2019</a:t>
             </a:fld>
             <a:endParaRPr lang="en-US"/>
           </a:p>
@@ -2164,7 +2162,7 @@
           <a:p>
             <a:fld id="{56C4885B-3C5C-43BB-9862-47948E5DF551}" type="datetime1">
               <a:rPr lang="en-US" smtClean="0"/>
-              <a:t>9/9/2019</a:t>
+              <a:t>9/10/2019</a:t>
             </a:fld>
             <a:endParaRPr lang="en-US"/>
           </a:p>
@@ -2554,7 +2552,7 @@
           <a:p>
             <a:fld id="{9703B6AF-AB61-4D8E-B7B7-705C5ACEBBCC}" type="datetime1">
               <a:rPr lang="en-US" smtClean="0"/>
-              <a:t>9/9/2019</a:t>
+              <a:t>9/10/2019</a:t>
             </a:fld>
             <a:endParaRPr lang="en-US"/>
           </a:p>
@@ -2683,7 +2681,7 @@
           <a:p>
             <a:fld id="{59B3EC9A-B094-4092-8061-75D86CB34931}" type="datetime1">
               <a:rPr lang="en-US" smtClean="0"/>
-              <a:t>9/9/2019</a:t>
+              <a:t>9/10/2019</a:t>
             </a:fld>
             <a:endParaRPr lang="en-US"/>
           </a:p>
@@ -2790,7 +2788,7 @@
           <a:p>
             <a:fld id="{64E1AEED-2323-4359-853E-316DF6600362}" type="datetime1">
               <a:rPr lang="en-US" smtClean="0"/>
-              <a:t>9/9/2019</a:t>
+              <a:t>9/10/2019</a:t>
             </a:fld>
             <a:endParaRPr lang="en-US"/>
           </a:p>
@@ -3069,7 +3067,7 @@
           <a:p>
             <a:fld id="{333AC2DF-F1FD-4724-A563-92BADFC82ECC}" type="datetime1">
               <a:rPr lang="en-US" smtClean="0"/>
-              <a:t>9/9/2019</a:t>
+              <a:t>9/10/2019</a:t>
             </a:fld>
             <a:endParaRPr lang="en-US"/>
           </a:p>
@@ -3376,7 +3374,7 @@
           <a:p>
             <a:fld id="{8D20E2CF-D74B-4B51-899A-DCEA821C90C7}" type="datetime1">
               <a:rPr lang="en-US" smtClean="0"/>
-              <a:t>9/9/2019</a:t>
+              <a:t>9/10/2019</a:t>
             </a:fld>
             <a:endParaRPr lang="en-US"/>
           </a:p>
@@ -8085,13 +8083,7 @@
       </p:grpSpPr>
       <p:sp>
         <p:nvSpPr>
-          <p:cNvPr id="3" name="Title 2">
-            <a:extLst>
-              <a:ext uri="{FF2B5EF4-FFF2-40B4-BE49-F238E27FC236}">
-                <a16:creationId xmlns:a16="http://schemas.microsoft.com/office/drawing/2014/main" id="{4F2C0421-67C2-468C-8B70-C820462BFD0D}"/>
-              </a:ext>
-            </a:extLst>
-          </p:cNvPr>
+          <p:cNvPr id="2" name="Title 1"/>
           <p:cNvSpPr>
             <a:spLocks noGrp="1"/>
           </p:cNvSpPr>
@@ -8101,8 +8093,8 @@
         </p:nvSpPr>
         <p:spPr>
           <a:xfrm>
-            <a:off x="447676" y="274638"/>
-            <a:ext cx="11163300" cy="1143000"/>
+            <a:off x="309564" y="-2960"/>
+            <a:ext cx="11570371" cy="1287481"/>
           </a:xfrm>
         </p:spPr>
         <p:txBody>
@@ -8118,17 +8110,429 @@
                 </a:solidFill>
                 <a:effectLst/>
               </a:rPr>
-              <a:t>Hypothesis 2: There is a significant difference between consumer satisfaction hospital ranks and the cost of medical procedures.</a:t>
-            </a:r>
+              <a:t>Hypothesis 1a: There is a significant difference between population(density) and medical procedure cost.</a:t>
+            </a:r>
+            <a:endParaRPr lang="en-US" dirty="0">
+              <a:solidFill>
+                <a:srgbClr val="FFFF66"/>
+              </a:solidFill>
+            </a:endParaRPr>
           </a:p>
         </p:txBody>
       </p:sp>
       <p:sp>
         <p:nvSpPr>
-          <p:cNvPr id="16" name="TextBox 15">
+          <p:cNvPr id="3" name="Content Placeholder 2">
             <a:extLst>
               <a:ext uri="{FF2B5EF4-FFF2-40B4-BE49-F238E27FC236}">
-                <a16:creationId xmlns:a16="http://schemas.microsoft.com/office/drawing/2014/main" id="{B90643FB-6118-42B2-866E-1B54F76F3EB0}"/>
+                <a16:creationId xmlns:a16="http://schemas.microsoft.com/office/drawing/2014/main" id="{80C1BCAA-CD4B-49E7-9D8B-415B3E66ADF7}"/>
+              </a:ext>
+            </a:extLst>
+          </p:cNvPr>
+          <p:cNvSpPr>
+            <a:spLocks noGrp="1"/>
+          </p:cNvSpPr>
+          <p:nvPr>
+            <p:ph idx="1"/>
+          </p:nvPr>
+        </p:nvSpPr>
+        <p:spPr>
+          <a:xfrm>
+            <a:off x="12028" y="1284937"/>
+            <a:ext cx="11570371" cy="769441"/>
+          </a:xfrm>
+        </p:spPr>
+        <p:txBody>
+          <a:bodyPr>
+            <a:normAutofit fontScale="55000" lnSpcReduction="20000"/>
+          </a:bodyPr>
+          <a:lstStyle/>
+          <a:p>
+            <a:r>
+              <a:rPr lang="en-US" dirty="0"/>
+              <a:t>Examining Mississippi – The statistics </a:t>
+            </a:r>
+            <a:r>
+              <a:rPr lang="en-US" b="1" u="sng" dirty="0"/>
+              <a:t>fail </a:t>
+            </a:r>
+            <a:r>
+              <a:rPr lang="en-US" dirty="0"/>
+              <a:t>to prove the hypothesis. </a:t>
+            </a:r>
+          </a:p>
+          <a:p>
+            <a:r>
+              <a:rPr lang="en-US" dirty="0"/>
+              <a:t>T-Test: The groups are not correlated as evidenced by high-T magnitude with good confidence (very low p-value)</a:t>
+            </a:r>
+          </a:p>
+          <a:p>
+            <a:r>
+              <a:rPr lang="en-US" dirty="0"/>
+              <a:t>Linear Regression: high p-value and low R^2 indicate bad fit. Polynomial fit not good</a:t>
+            </a:r>
+          </a:p>
+        </p:txBody>
+      </p:sp>
+      <p:grpSp>
+        <p:nvGrpSpPr>
+          <p:cNvPr id="13" name="Group 12">
+            <a:extLst>
+              <a:ext uri="{FF2B5EF4-FFF2-40B4-BE49-F238E27FC236}">
+                <a16:creationId xmlns:a16="http://schemas.microsoft.com/office/drawing/2014/main" id="{08237700-3102-4724-AB64-B34D5CFB56F8}"/>
+              </a:ext>
+            </a:extLst>
+          </p:cNvPr>
+          <p:cNvGrpSpPr/>
+          <p:nvPr/>
+        </p:nvGrpSpPr>
+        <p:grpSpPr>
+          <a:xfrm>
+            <a:off x="6300158" y="2148423"/>
+            <a:ext cx="5488964" cy="4427874"/>
+            <a:chOff x="6300158" y="2148423"/>
+            <a:chExt cx="5488964" cy="4427874"/>
+          </a:xfrm>
+        </p:grpSpPr>
+        <p:pic>
+          <p:nvPicPr>
+            <p:cNvPr id="8" name="Picture 7" descr="A screenshot of a cell phone&#10;&#10;Description automatically generated">
+              <a:extLst>
+                <a:ext uri="{FF2B5EF4-FFF2-40B4-BE49-F238E27FC236}">
+                  <a16:creationId xmlns:a16="http://schemas.microsoft.com/office/drawing/2014/main" id="{F12F32C6-3B6B-4463-B9FC-73E7D30C4DD1}"/>
+                </a:ext>
+              </a:extLst>
+            </p:cNvPr>
+            <p:cNvPicPr>
+              <a:picLocks noChangeAspect="1"/>
+            </p:cNvPicPr>
+            <p:nvPr/>
+          </p:nvPicPr>
+          <p:blipFill>
+            <a:blip r:embed="rId2">
+              <a:extLst>
+                <a:ext uri="{28A0092B-C50C-407E-A947-70E740481C1C}">
+                  <a14:useLocalDpi xmlns:a14="http://schemas.microsoft.com/office/drawing/2010/main" val="0"/>
+                </a:ext>
+              </a:extLst>
+            </a:blip>
+            <a:stretch>
+              <a:fillRect/>
+            </a:stretch>
+          </p:blipFill>
+          <p:spPr>
+            <a:xfrm>
+              <a:off x="6300158" y="2148423"/>
+              <a:ext cx="5487650" cy="3658433"/>
+            </a:xfrm>
+            <a:prstGeom prst="rect">
+              <a:avLst/>
+            </a:prstGeom>
+          </p:spPr>
+        </p:pic>
+        <p:sp>
+          <p:nvSpPr>
+            <p:cNvPr id="10" name="TextBox 9">
+              <a:extLst>
+                <a:ext uri="{FF2B5EF4-FFF2-40B4-BE49-F238E27FC236}">
+                  <a16:creationId xmlns:a16="http://schemas.microsoft.com/office/drawing/2014/main" id="{A850DBD7-271D-4A7C-82BC-838169624B84}"/>
+                </a:ext>
+              </a:extLst>
+            </p:cNvPr>
+            <p:cNvSpPr txBox="1"/>
+            <p:nvPr/>
+          </p:nvSpPr>
+          <p:spPr>
+            <a:xfrm>
+              <a:off x="6300158" y="5806856"/>
+              <a:ext cx="5488964" cy="769441"/>
+            </a:xfrm>
+            <a:prstGeom prst="rect">
+              <a:avLst/>
+            </a:prstGeom>
+            <a:solidFill>
+              <a:schemeClr val="tx1"/>
+            </a:solidFill>
+          </p:spPr>
+          <p:txBody>
+            <a:bodyPr wrap="square" rtlCol="0">
+              <a:spAutoFit/>
+            </a:bodyPr>
+            <a:lstStyle/>
+            <a:p>
+              <a:r>
+                <a:rPr lang="en-US" sz="1100" dirty="0">
+                  <a:solidFill>
+                    <a:schemeClr val="tx2">
+                      <a:lumMod val="10000"/>
+                    </a:schemeClr>
+                  </a:solidFill>
+                </a:rPr>
+                <a:t>T-Test: T-Value = -7.330113910577341, </a:t>
+              </a:r>
+              <a:r>
+                <a:rPr lang="en-US" sz="1100" dirty="0" err="1">
+                  <a:solidFill>
+                    <a:schemeClr val="tx2">
+                      <a:lumMod val="10000"/>
+                    </a:schemeClr>
+                  </a:solidFill>
+                </a:rPr>
+                <a:t>pvalue</a:t>
+              </a:r>
+              <a:r>
+                <a:rPr lang="en-US" sz="1100" dirty="0">
+                  <a:solidFill>
+                    <a:schemeClr val="tx2">
+                      <a:lumMod val="10000"/>
+                    </a:schemeClr>
+                  </a:solidFill>
+                </a:rPr>
+                <a:t> = 2.4202410480315282e-06</a:t>
+              </a:r>
+            </a:p>
+            <a:p>
+              <a:r>
+                <a:rPr lang="en-US" sz="1100" dirty="0">
+                  <a:solidFill>
+                    <a:schemeClr val="tx2">
+                      <a:lumMod val="10000"/>
+                    </a:schemeClr>
+                  </a:solidFill>
+                </a:rPr>
+                <a:t>Linear Regression: Slope = 2.387899055961176, Intercept = 25168.00982295613, </a:t>
+              </a:r>
+            </a:p>
+            <a:p>
+              <a:r>
+                <a:rPr lang="en-US" sz="1100" dirty="0">
+                  <a:solidFill>
+                    <a:schemeClr val="tx2">
+                      <a:lumMod val="10000"/>
+                    </a:schemeClr>
+                  </a:solidFill>
+                </a:rPr>
+                <a:t>	     </a:t>
+              </a:r>
+              <a:r>
+                <a:rPr lang="en-US" sz="1100" dirty="0" err="1">
+                  <a:solidFill>
+                    <a:schemeClr val="tx2">
+                      <a:lumMod val="10000"/>
+                    </a:schemeClr>
+                  </a:solidFill>
+                </a:rPr>
+                <a:t>Pvalue</a:t>
+              </a:r>
+              <a:r>
+                <a:rPr lang="en-US" sz="1100" dirty="0">
+                  <a:solidFill>
+                    <a:schemeClr val="tx2">
+                      <a:lumMod val="10000"/>
+                    </a:schemeClr>
+                  </a:solidFill>
+                </a:rPr>
+                <a:t> = 0.6779137724186564, R^2=0.012686186738626407</a:t>
+              </a:r>
+            </a:p>
+            <a:p>
+              <a:r>
+                <a:rPr lang="en-US" sz="1100" dirty="0">
+                  <a:solidFill>
+                    <a:schemeClr val="tx2">
+                      <a:lumMod val="10000"/>
+                    </a:schemeClr>
+                  </a:solidFill>
+                </a:rPr>
+                <a:t>Polynomial Regression:   -3.707e-08 x ^4+ 0.0001527 x^3 - 0.1875 x ^2+ 75.04 x + 1.955e+04</a:t>
+              </a:r>
+            </a:p>
+          </p:txBody>
+        </p:sp>
+      </p:grpSp>
+      <p:grpSp>
+        <p:nvGrpSpPr>
+          <p:cNvPr id="14" name="Group 13">
+            <a:extLst>
+              <a:ext uri="{FF2B5EF4-FFF2-40B4-BE49-F238E27FC236}">
+                <a16:creationId xmlns:a16="http://schemas.microsoft.com/office/drawing/2014/main" id="{C80B5D75-1A09-4F51-9EBD-0095D3BCD201}"/>
+              </a:ext>
+            </a:extLst>
+          </p:cNvPr>
+          <p:cNvGrpSpPr/>
+          <p:nvPr/>
+        </p:nvGrpSpPr>
+        <p:grpSpPr>
+          <a:xfrm>
+            <a:off x="309564" y="2148423"/>
+            <a:ext cx="5487650" cy="4428290"/>
+            <a:chOff x="309564" y="2148423"/>
+            <a:chExt cx="5487650" cy="4428290"/>
+          </a:xfrm>
+        </p:grpSpPr>
+        <p:pic>
+          <p:nvPicPr>
+            <p:cNvPr id="5" name="Picture 4" descr="A screenshot of a cell phone&#10;&#10;Description automatically generated">
+              <a:extLst>
+                <a:ext uri="{FF2B5EF4-FFF2-40B4-BE49-F238E27FC236}">
+                  <a16:creationId xmlns:a16="http://schemas.microsoft.com/office/drawing/2014/main" id="{653FAD42-04CB-4AF9-A1BF-AC12BFA4C94F}"/>
+                </a:ext>
+              </a:extLst>
+            </p:cNvPr>
+            <p:cNvPicPr>
+              <a:picLocks noChangeAspect="1"/>
+            </p:cNvPicPr>
+            <p:nvPr/>
+          </p:nvPicPr>
+          <p:blipFill>
+            <a:blip r:embed="rId3">
+              <a:extLst>
+                <a:ext uri="{28A0092B-C50C-407E-A947-70E740481C1C}">
+                  <a14:useLocalDpi xmlns:a14="http://schemas.microsoft.com/office/drawing/2010/main" val="0"/>
+                </a:ext>
+              </a:extLst>
+            </a:blip>
+            <a:stretch>
+              <a:fillRect/>
+            </a:stretch>
+          </p:blipFill>
+          <p:spPr>
+            <a:xfrm>
+              <a:off x="309564" y="2148423"/>
+              <a:ext cx="5487650" cy="3658433"/>
+            </a:xfrm>
+            <a:prstGeom prst="rect">
+              <a:avLst/>
+            </a:prstGeom>
+          </p:spPr>
+        </p:pic>
+        <p:sp>
+          <p:nvSpPr>
+            <p:cNvPr id="11" name="TextBox 10">
+              <a:extLst>
+                <a:ext uri="{FF2B5EF4-FFF2-40B4-BE49-F238E27FC236}">
+                  <a16:creationId xmlns:a16="http://schemas.microsoft.com/office/drawing/2014/main" id="{F5635036-439F-480E-9C24-8F89F70B2F04}"/>
+                </a:ext>
+              </a:extLst>
+            </p:cNvPr>
+            <p:cNvSpPr txBox="1"/>
+            <p:nvPr/>
+          </p:nvSpPr>
+          <p:spPr>
+            <a:xfrm>
+              <a:off x="309832" y="5807272"/>
+              <a:ext cx="5487382" cy="769441"/>
+            </a:xfrm>
+            <a:prstGeom prst="rect">
+              <a:avLst/>
+            </a:prstGeom>
+            <a:solidFill>
+              <a:schemeClr val="tx1"/>
+            </a:solidFill>
+          </p:spPr>
+          <p:txBody>
+            <a:bodyPr wrap="square" rtlCol="0">
+              <a:spAutoFit/>
+            </a:bodyPr>
+            <a:lstStyle/>
+            <a:p>
+              <a:r>
+                <a:rPr lang="en-US" sz="1100" dirty="0">
+                  <a:solidFill>
+                    <a:schemeClr val="tx2">
+                      <a:lumMod val="10000"/>
+                    </a:schemeClr>
+                  </a:solidFill>
+                </a:rPr>
+                <a:t>T-Test: T-Value = -8.435976191821668, </a:t>
+              </a:r>
+              <a:r>
+                <a:rPr lang="en-US" sz="1100" dirty="0" err="1">
+                  <a:solidFill>
+                    <a:schemeClr val="tx2">
+                      <a:lumMod val="10000"/>
+                    </a:schemeClr>
+                  </a:solidFill>
+                </a:rPr>
+                <a:t>pvalue</a:t>
+              </a:r>
+              <a:r>
+                <a:rPr lang="en-US" sz="1100" dirty="0">
+                  <a:solidFill>
+                    <a:schemeClr val="tx2">
+                      <a:lumMod val="10000"/>
+                    </a:schemeClr>
+                  </a:solidFill>
+                </a:rPr>
+                <a:t> = 2.4096964561007347e-08</a:t>
+              </a:r>
+            </a:p>
+            <a:p>
+              <a:r>
+                <a:rPr lang="en-US" sz="1100" dirty="0">
+                  <a:solidFill>
+                    <a:schemeClr val="tx2">
+                      <a:lumMod val="10000"/>
+                    </a:schemeClr>
+                  </a:solidFill>
+                </a:rPr>
+                <a:t>Linear Regression: Slope = 2.8376244389968734, Intercept = 65167.56099879802, </a:t>
+              </a:r>
+            </a:p>
+            <a:p>
+              <a:r>
+                <a:rPr lang="en-US" sz="1100" dirty="0">
+                  <a:solidFill>
+                    <a:schemeClr val="tx2">
+                      <a:lumMod val="10000"/>
+                    </a:schemeClr>
+                  </a:solidFill>
+                </a:rPr>
+                <a:t>	     </a:t>
+              </a:r>
+              <a:r>
+                <a:rPr lang="en-US" sz="1100" dirty="0" err="1">
+                  <a:solidFill>
+                    <a:schemeClr val="tx2">
+                      <a:lumMod val="10000"/>
+                    </a:schemeClr>
+                  </a:solidFill>
+                </a:rPr>
+                <a:t>Pvalue</a:t>
+              </a:r>
+              <a:r>
+                <a:rPr lang="en-US" sz="1100" dirty="0">
+                  <a:solidFill>
+                    <a:schemeClr val="tx2">
+                      <a:lumMod val="10000"/>
+                    </a:schemeClr>
+                  </a:solidFill>
+                </a:rPr>
+                <a:t> = 0.8381376720055401, R^2=0.002032867482902925</a:t>
+              </a:r>
+            </a:p>
+            <a:p>
+              <a:r>
+                <a:rPr lang="en-US" sz="1100" dirty="0">
+                  <a:solidFill>
+                    <a:schemeClr val="tx2">
+                      <a:lumMod val="10000"/>
+                    </a:schemeClr>
+                  </a:solidFill>
+                </a:rPr>
+                <a:t>Polynomial Regression: -6.902e-08 x ^4+ 0.0003221 x ^3- 0.4963 x^2 + 279.9 x + 3.305e+04</a:t>
+              </a:r>
+            </a:p>
+          </p:txBody>
+        </p:sp>
+      </p:grpSp>
+      <p:sp>
+        <p:nvSpPr>
+          <p:cNvPr id="12" name="TextBox 11">
+            <a:extLst>
+              <a:ext uri="{FF2B5EF4-FFF2-40B4-BE49-F238E27FC236}">
+                <a16:creationId xmlns:a16="http://schemas.microsoft.com/office/drawing/2014/main" id="{0ED60382-C33D-41BC-97FE-DF913B9A2714}"/>
               </a:ext>
             </a:extLst>
           </p:cNvPr>
@@ -8137,8 +8541,8 @@
         </p:nvSpPr>
         <p:spPr>
           <a:xfrm>
-            <a:off x="2017990" y="1638330"/>
-            <a:ext cx="7989903" cy="646331"/>
+            <a:off x="9624484" y="1115244"/>
+            <a:ext cx="2209387" cy="1107996"/>
           </a:xfrm>
           <a:prstGeom prst="rect">
             <a:avLst/>
@@ -8146,61 +8550,26 @@
           <a:noFill/>
         </p:spPr>
         <p:txBody>
-          <a:bodyPr wrap="square" rtlCol="0" anchor="ctr">
+          <a:bodyPr wrap="none" rtlCol="0">
             <a:spAutoFit/>
           </a:bodyPr>
           <a:lstStyle/>
           <a:p>
-            <a:pPr marL="285750" indent="-285750">
-              <a:buFont typeface="Arial" panose="020B0604020202020204" pitchFamily="34" charset="0"/>
-              <a:buChar char="•"/>
-            </a:pPr>
-            <a:r>
-              <a:rPr lang="en-US" dirty="0"/>
-              <a:t>The graph below shows all recorded payments for the specific procedure “638 – DIABETES WCC” versus hospital consumer satisfaction ranking (Low = Better)</a:t>
+            <a:r>
+              <a:rPr lang="en-US" sz="6600" b="1" dirty="0">
+                <a:solidFill>
+                  <a:srgbClr val="FF0000"/>
+                </a:solidFill>
+              </a:rPr>
+              <a:t>FALSE</a:t>
             </a:r>
           </a:p>
         </p:txBody>
       </p:sp>
-      <p:pic>
-        <p:nvPicPr>
-          <p:cNvPr id="6" name="Content Placeholder 5">
-            <a:extLst>
-              <a:ext uri="{FF2B5EF4-FFF2-40B4-BE49-F238E27FC236}">
-                <a16:creationId xmlns:a16="http://schemas.microsoft.com/office/drawing/2014/main" id="{5D528B22-3D34-4E9E-8015-20AA303F1E03}"/>
-              </a:ext>
-            </a:extLst>
-          </p:cNvPr>
-          <p:cNvPicPr>
-            <a:picLocks noGrp="1" noChangeAspect="1"/>
-          </p:cNvPicPr>
-          <p:nvPr>
-            <p:ph idx="1"/>
-          </p:nvPr>
-        </p:nvPicPr>
-        <p:blipFill>
-          <a:blip r:embed="rId2">
-            <a:extLst>
-              <a:ext uri="{28A0092B-C50C-407E-A947-70E740481C1C}">
-                <a14:useLocalDpi xmlns:a14="http://schemas.microsoft.com/office/drawing/2010/main" val="0"/>
-              </a:ext>
-            </a:extLst>
-          </a:blip>
-          <a:stretch>
-            <a:fillRect/>
-          </a:stretch>
-        </p:blipFill>
-        <p:spPr>
-          <a:xfrm>
-            <a:off x="1984949" y="2472311"/>
-            <a:ext cx="8222102" cy="4111051"/>
-          </a:xfrm>
-        </p:spPr>
-      </p:pic>
     </p:spTree>
     <p:extLst>
       <p:ext uri="{BB962C8B-B14F-4D97-AF65-F5344CB8AC3E}">
-        <p14:creationId xmlns:p14="http://schemas.microsoft.com/office/powerpoint/2010/main" val="2383658963"/>
+        <p14:creationId xmlns:p14="http://schemas.microsoft.com/office/powerpoint/2010/main" val="2630643345"/>
       </p:ext>
     </p:extLst>
   </p:cSld>
@@ -8223,163 +8592,6 @@
 </file>
 
 <file path=ppt/slides/slide11.xml><?xml version="1.0" encoding="utf-8"?>
-<p:sld xmlns:a="http://schemas.openxmlformats.org/drawingml/2006/main" xmlns:r="http://schemas.openxmlformats.org/officeDocument/2006/relationships" xmlns:p="http://schemas.openxmlformats.org/presentationml/2006/main">
-  <p:cSld>
-    <p:spTree>
-      <p:nvGrpSpPr>
-        <p:cNvPr id="1" name=""/>
-        <p:cNvGrpSpPr/>
-        <p:nvPr/>
-      </p:nvGrpSpPr>
-      <p:grpSpPr>
-        <a:xfrm>
-          <a:off x="0" y="0"/>
-          <a:ext cx="0" cy="0"/>
-          <a:chOff x="0" y="0"/>
-          <a:chExt cx="0" cy="0"/>
-        </a:xfrm>
-      </p:grpSpPr>
-      <p:sp>
-        <p:nvSpPr>
-          <p:cNvPr id="3" name="Title 2">
-            <a:extLst>
-              <a:ext uri="{FF2B5EF4-FFF2-40B4-BE49-F238E27FC236}">
-                <a16:creationId xmlns:a16="http://schemas.microsoft.com/office/drawing/2014/main" id="{4F2C0421-67C2-468C-8B70-C820462BFD0D}"/>
-              </a:ext>
-            </a:extLst>
-          </p:cNvPr>
-          <p:cNvSpPr>
-            <a:spLocks noGrp="1"/>
-          </p:cNvSpPr>
-          <p:nvPr>
-            <p:ph type="title"/>
-          </p:nvPr>
-        </p:nvSpPr>
-        <p:spPr>
-          <a:xfrm>
-            <a:off x="447676" y="274638"/>
-            <a:ext cx="11163300" cy="1143000"/>
-          </a:xfrm>
-        </p:spPr>
-        <p:txBody>
-          <a:bodyPr>
-            <a:normAutofit fontScale="90000"/>
-          </a:bodyPr>
-          <a:lstStyle/>
-          <a:p>
-            <a:r>
-              <a:rPr lang="en-US" dirty="0">
-                <a:solidFill>
-                  <a:srgbClr val="FFFF00"/>
-                </a:solidFill>
-                <a:effectLst/>
-              </a:rPr>
-              <a:t>Hypothesis 2: There is a significant difference between consumer satisfaction hospital ranks and the cost of medical procedures.</a:t>
-            </a:r>
-          </a:p>
-        </p:txBody>
-      </p:sp>
-      <p:sp>
-        <p:nvSpPr>
-          <p:cNvPr id="16" name="TextBox 15">
-            <a:extLst>
-              <a:ext uri="{FF2B5EF4-FFF2-40B4-BE49-F238E27FC236}">
-                <a16:creationId xmlns:a16="http://schemas.microsoft.com/office/drawing/2014/main" id="{B90643FB-6118-42B2-866E-1B54F76F3EB0}"/>
-              </a:ext>
-            </a:extLst>
-          </p:cNvPr>
-          <p:cNvSpPr txBox="1"/>
-          <p:nvPr/>
-        </p:nvSpPr>
-        <p:spPr>
-          <a:xfrm>
-            <a:off x="1214438" y="1642706"/>
-            <a:ext cx="9629775" cy="923330"/>
-          </a:xfrm>
-          <a:prstGeom prst="rect">
-            <a:avLst/>
-          </a:prstGeom>
-          <a:noFill/>
-        </p:spPr>
-        <p:txBody>
-          <a:bodyPr wrap="square" rtlCol="0" anchor="ctr">
-            <a:spAutoFit/>
-          </a:bodyPr>
-          <a:lstStyle/>
-          <a:p>
-            <a:pPr marL="285750" indent="-285750">
-              <a:buFont typeface="Arial" panose="020B0604020202020204" pitchFamily="34" charset="0"/>
-              <a:buChar char="•"/>
-            </a:pPr>
-            <a:r>
-              <a:rPr lang="en-US" dirty="0"/>
-              <a:t>The graph below shows all recorded payments for the specific procedure “470 - MAJOR JOINT REPLACEMENT OR REATTACHMENT OF LOWER EXTREMITY W/O MCC” versus hospital consumer satisfaction ranking (Low = Better)</a:t>
-            </a:r>
-          </a:p>
-        </p:txBody>
-      </p:sp>
-      <p:pic>
-        <p:nvPicPr>
-          <p:cNvPr id="8" name="Picture 7">
-            <a:extLst>
-              <a:ext uri="{FF2B5EF4-FFF2-40B4-BE49-F238E27FC236}">
-                <a16:creationId xmlns:a16="http://schemas.microsoft.com/office/drawing/2014/main" id="{3120441C-D178-41BB-8668-953BFF2FA1DA}"/>
-              </a:ext>
-            </a:extLst>
-          </p:cNvPr>
-          <p:cNvPicPr>
-            <a:picLocks noChangeAspect="1"/>
-          </p:cNvPicPr>
-          <p:nvPr/>
-        </p:nvPicPr>
-        <p:blipFill>
-          <a:blip r:embed="rId2">
-            <a:extLst>
-              <a:ext uri="{28A0092B-C50C-407E-A947-70E740481C1C}">
-                <a14:useLocalDpi xmlns:a14="http://schemas.microsoft.com/office/drawing/2010/main" val="0"/>
-              </a:ext>
-            </a:extLst>
-          </a:blip>
-          <a:stretch>
-            <a:fillRect/>
-          </a:stretch>
-        </p:blipFill>
-        <p:spPr>
-          <a:xfrm>
-            <a:off x="1890712" y="2566036"/>
-            <a:ext cx="8277225" cy="4138613"/>
-          </a:xfrm>
-          <a:prstGeom prst="rect">
-            <a:avLst/>
-          </a:prstGeom>
-        </p:spPr>
-      </p:pic>
-    </p:spTree>
-    <p:extLst>
-      <p:ext uri="{BB962C8B-B14F-4D97-AF65-F5344CB8AC3E}">
-        <p14:creationId xmlns:p14="http://schemas.microsoft.com/office/powerpoint/2010/main" val="896269514"/>
-      </p:ext>
-    </p:extLst>
-  </p:cSld>
-  <p:clrMapOvr>
-    <a:masterClrMapping/>
-  </p:clrMapOvr>
-  <mc:AlternateContent xmlns:mc="http://schemas.openxmlformats.org/markup-compatibility/2006" xmlns:p14="http://schemas.microsoft.com/office/powerpoint/2010/main">
-    <mc:Choice Requires="p14">
-      <p:transition spd="med" p14:dur="700">
-        <p:fade/>
-      </p:transition>
-    </mc:Choice>
-    <mc:Fallback xmlns="">
-      <p:transition spd="med">
-        <p:fade/>
-      </p:transition>
-    </mc:Fallback>
-  </mc:AlternateContent>
-</p:sld>
-</file>
-
-<file path=ppt/slides/slide12.xml><?xml version="1.0" encoding="utf-8"?>
 <p:sld xmlns:a="http://schemas.openxmlformats.org/drawingml/2006/main" xmlns:r="http://schemas.openxmlformats.org/officeDocument/2006/relationships" xmlns:p="http://schemas.openxmlformats.org/presentationml/2006/main">
   <p:cSld>
     <p:spTree>
@@ -8553,7 +8765,7 @@
 </p:sld>
 </file>
 
-<file path=ppt/slides/slide13.xml><?xml version="1.0" encoding="utf-8"?>
+<file path=ppt/slides/slide12.xml><?xml version="1.0" encoding="utf-8"?>
 <p:sld xmlns:a="http://schemas.openxmlformats.org/drawingml/2006/main" xmlns:r="http://schemas.openxmlformats.org/officeDocument/2006/relationships" xmlns:p="http://schemas.openxmlformats.org/presentationml/2006/main">
   <p:cSld>
     <p:spTree>
@@ -8729,7 +8941,7 @@
 </p:sld>
 </file>
 
-<file path=ppt/slides/slide14.xml><?xml version="1.0" encoding="utf-8"?>
+<file path=ppt/slides/slide13.xml><?xml version="1.0" encoding="utf-8"?>
 <p:sld xmlns:a="http://schemas.openxmlformats.org/drawingml/2006/main" xmlns:r="http://schemas.openxmlformats.org/officeDocument/2006/relationships" xmlns:p="http://schemas.openxmlformats.org/presentationml/2006/main">
   <p:cSld>
     <p:spTree>
@@ -9191,6 +9403,117 @@
 </p:sld>
 </file>
 
+<file path=ppt/slides/slide14.xml><?xml version="1.0" encoding="utf-8"?>
+<p:sld xmlns:a="http://schemas.openxmlformats.org/drawingml/2006/main" xmlns:r="http://schemas.openxmlformats.org/officeDocument/2006/relationships" xmlns:p="http://schemas.openxmlformats.org/presentationml/2006/main">
+  <p:cSld>
+    <p:spTree>
+      <p:nvGrpSpPr>
+        <p:cNvPr id="1" name=""/>
+        <p:cNvGrpSpPr/>
+        <p:nvPr/>
+      </p:nvGrpSpPr>
+      <p:grpSpPr>
+        <a:xfrm>
+          <a:off x="0" y="0"/>
+          <a:ext cx="0" cy="0"/>
+          <a:chOff x="0" y="0"/>
+          <a:chExt cx="0" cy="0"/>
+        </a:xfrm>
+      </p:grpSpPr>
+      <p:sp>
+        <p:nvSpPr>
+          <p:cNvPr id="2" name="Title 1"/>
+          <p:cNvSpPr>
+            <a:spLocks noGrp="1"/>
+          </p:cNvSpPr>
+          <p:nvPr>
+            <p:ph type="title"/>
+          </p:nvPr>
+        </p:nvSpPr>
+        <p:spPr>
+          <a:xfrm>
+            <a:off x="429575" y="-165295"/>
+            <a:ext cx="11544886" cy="1143000"/>
+          </a:xfrm>
+        </p:spPr>
+        <p:txBody>
+          <a:bodyPr>
+            <a:normAutofit/>
+          </a:bodyPr>
+          <a:lstStyle/>
+          <a:p>
+            <a:r>
+              <a:rPr lang="en-US" dirty="0">
+                <a:solidFill>
+                  <a:srgbClr val="FFFF66"/>
+                </a:solidFill>
+              </a:rPr>
+              <a:t>California …</a:t>
+            </a:r>
+          </a:p>
+        </p:txBody>
+      </p:sp>
+      <p:sp>
+        <p:nvSpPr>
+          <p:cNvPr id="3" name="Content Placeholder 2">
+            <a:extLst>
+              <a:ext uri="{FF2B5EF4-FFF2-40B4-BE49-F238E27FC236}">
+                <a16:creationId xmlns:a16="http://schemas.microsoft.com/office/drawing/2014/main" id="{80C1BCAA-CD4B-49E7-9D8B-415B3E66ADF7}"/>
+              </a:ext>
+            </a:extLst>
+          </p:cNvPr>
+          <p:cNvSpPr>
+            <a:spLocks noGrp="1"/>
+          </p:cNvSpPr>
+          <p:nvPr>
+            <p:ph idx="1"/>
+          </p:nvPr>
+        </p:nvSpPr>
+        <p:spPr>
+          <a:xfrm>
+            <a:off x="0" y="787791"/>
+            <a:ext cx="11141612" cy="814008"/>
+          </a:xfrm>
+        </p:spPr>
+        <p:txBody>
+          <a:bodyPr>
+            <a:normAutofit/>
+          </a:bodyPr>
+          <a:lstStyle/>
+          <a:p>
+            <a:r>
+              <a:rPr lang="en-US" sz="2000" dirty="0" err="1"/>
+              <a:t>xyz</a:t>
+            </a:r>
+            <a:endParaRPr lang="en-US" sz="2000" dirty="0"/>
+          </a:p>
+        </p:txBody>
+      </p:sp>
+    </p:spTree>
+    <p:extLst>
+      <p:ext uri="{BB962C8B-B14F-4D97-AF65-F5344CB8AC3E}">
+        <p14:creationId xmlns:p14="http://schemas.microsoft.com/office/powerpoint/2010/main" val="273222095"/>
+      </p:ext>
+    </p:extLst>
+  </p:cSld>
+  <p:clrMapOvr>
+    <a:masterClrMapping/>
+  </p:clrMapOvr>
+  <mc:AlternateContent xmlns:mc="http://schemas.openxmlformats.org/markup-compatibility/2006" xmlns:p14="http://schemas.microsoft.com/office/powerpoint/2010/main">
+    <mc:Choice Requires="p14">
+      <p:transition spd="med" p14:dur="700">
+        <p:fade/>
+      </p:transition>
+    </mc:Choice>
+    <mc:Fallback xmlns="">
+      <p:transition spd="med">
+        <p:fade/>
+      </p:transition>
+    </mc:Fallback>
+  </mc:AlternateContent>
+</p:sld>
+</file>
+
 <file path=ppt/slides/slide15.xml><?xml version="1.0" encoding="utf-8"?>
 <p:sld xmlns:a="http://schemas.openxmlformats.org/drawingml/2006/main" xmlns:r="http://schemas.openxmlformats.org/officeDocument/2006/relationships" xmlns:p="http://schemas.openxmlformats.org/presentationml/2006/main">
   <p:cSld>
@@ -10438,7 +10761,7 @@
         </p:nvSpPr>
         <p:spPr>
           <a:xfrm>
-            <a:off x="323557" y="749105"/>
+            <a:off x="323557" y="1334892"/>
             <a:ext cx="11544886" cy="1832170"/>
           </a:xfrm>
         </p:spPr>
@@ -10448,6 +10771,7 @@
           </a:bodyPr>
           <a:lstStyle/>
           <a:p>
+            <a:pPr algn="l"/>
             <a:r>
               <a:rPr lang="en-US" dirty="0">
                 <a:solidFill>
@@ -10476,7 +10800,7 @@
                   <a:srgbClr val="FFFF66"/>
                 </a:solidFill>
               </a:rPr>
-              <a:t>Null Hypothesis 1: </a:t>
+              <a:t>Hypothesis 1: </a:t>
             </a:r>
             <a:r>
               <a:rPr lang="en-US" dirty="0">
@@ -10485,7 +10809,42 @@
                 </a:solidFill>
                 <a:effectLst/>
               </a:rPr>
-              <a:t>There is not a significant difference between population and medical procedure cost.</a:t>
+              <a:t>There is a significant difference between population and medical procedure cost. </a:t>
+            </a:r>
+            <a:br>
+              <a:rPr lang="en-US" dirty="0">
+                <a:solidFill>
+                  <a:srgbClr val="FFFF00"/>
+                </a:solidFill>
+                <a:effectLst/>
+              </a:rPr>
+            </a:br>
+            <a:r>
+              <a:rPr lang="en-US" dirty="0">
+                <a:solidFill>
+                  <a:srgbClr val="00FF00"/>
+                </a:solidFill>
+                <a:effectLst/>
+              </a:rPr>
+              <a:t>TRUE Nationally </a:t>
+            </a:r>
+            <a:r>
+              <a:rPr lang="en-US" sz="3600" dirty="0">
+                <a:solidFill>
+                  <a:srgbClr val="00FF00"/>
+                </a:solidFill>
+                <a:effectLst/>
+              </a:rPr>
+              <a:t>(p=0.00002) </a:t>
+            </a:r>
+            <a:r>
+              <a:rPr lang="en-US" dirty="0">
+                <a:solidFill>
+                  <a:srgbClr val="FF0000"/>
+                </a:solidFill>
+                <a:effectLst/>
+              </a:rPr>
+              <a:t>FALSE Locally</a:t>
             </a:r>
             <a:br>
               <a:rPr lang="en-US" dirty="0">
@@ -10499,53 +10858,6 @@
                 <a:srgbClr val="FFFF66"/>
               </a:solidFill>
             </a:endParaRPr>
-          </a:p>
-        </p:txBody>
-      </p:sp>
-      <p:sp>
-        <p:nvSpPr>
-          <p:cNvPr id="3" name="TextBox 2">
-            <a:extLst>
-              <a:ext uri="{FF2B5EF4-FFF2-40B4-BE49-F238E27FC236}">
-                <a16:creationId xmlns:a16="http://schemas.microsoft.com/office/drawing/2014/main" id="{92C44FD9-36A0-4741-8578-670A028DA20F}"/>
-              </a:ext>
-            </a:extLst>
-          </p:cNvPr>
-          <p:cNvSpPr txBox="1"/>
-          <p:nvPr/>
-        </p:nvSpPr>
-        <p:spPr>
-          <a:xfrm>
-            <a:off x="1057275" y="5033940"/>
-            <a:ext cx="10077450" cy="1107996"/>
-          </a:xfrm>
-          <a:prstGeom prst="rect">
-            <a:avLst/>
-          </a:prstGeom>
-          <a:noFill/>
-        </p:spPr>
-        <p:txBody>
-          <a:bodyPr wrap="square" rtlCol="0">
-            <a:spAutoFit/>
-          </a:bodyPr>
-          <a:lstStyle/>
-          <a:p>
-            <a:r>
-              <a:rPr lang="en-US" sz="2200" dirty="0"/>
-              <a:t>We are able to reject both of the above null hypothesizes since p-values &lt; 0.05, however the correlation coefficients (</a:t>
-            </a:r>
-            <a:r>
-              <a:rPr lang="en-US" sz="2200" dirty="0" err="1"/>
-              <a:t>r-value</a:t>
-            </a:r>
-            <a:r>
-              <a:rPr lang="en-US" sz="2200"/>
-              <a:t>) are </a:t>
-            </a:r>
-            <a:r>
-              <a:rPr lang="en-US" sz="2200" dirty="0"/>
-              <a:t>too low to make practical conclusions.</a:t>
-            </a:r>
           </a:p>
         </p:txBody>
       </p:sp>
@@ -10565,7 +10877,7 @@
         </p:nvSpPr>
         <p:spPr>
           <a:xfrm>
-            <a:off x="85432" y="2673155"/>
+            <a:off x="323557" y="3815447"/>
             <a:ext cx="11544886" cy="1832170"/>
           </a:xfrm>
           <a:prstGeom prst="rect">
@@ -10612,6 +10924,7 @@
             </a:lvl1pPr>
           </a:lstStyle>
           <a:p>
+            <a:pPr algn="l"/>
             <a:br>
               <a:rPr lang="en-US" sz="3700" dirty="0">
                 <a:solidFill>
@@ -10622,10 +10935,10 @@
             <a:r>
               <a:rPr lang="en-US" sz="3700" dirty="0">
                 <a:solidFill>
-                  <a:srgbClr val="FFFF66"/>
+                  <a:schemeClr val="tx1"/>
                 </a:solidFill>
               </a:rPr>
-              <a:t>     Null Hypothesis 2: </a:t>
+              <a:t>Hypothesis 2: </a:t>
             </a:r>
             <a:r>
               <a:rPr lang="en-US" sz="3700" dirty="0">
@@ -10634,7 +10947,25 @@
                 </a:solidFill>
                 <a:effectLst/>
               </a:rPr>
-              <a:t>There is not a significant difference between consumer satisfaction hospital ranks and the cost of medical procedures.</a:t>
+              <a:t>There is not a significant difference between consumer satisfaction hospital ranks and the cost of medical procedures. </a:t>
+            </a:r>
+            <a:r>
+              <a:rPr lang="en-US" sz="4000" dirty="0">
+                <a:solidFill>
+                  <a:srgbClr val="00FF00"/>
+                </a:solidFill>
+                <a:effectLst/>
+              </a:rPr>
+              <a:t>TRUE Nationally  </a:t>
+            </a:r>
+            <a:r>
+              <a:rPr lang="en-US" sz="2800" b="0" dirty="0">
+                <a:solidFill>
+                  <a:srgbClr val="00FF00"/>
+                </a:solidFill>
+                <a:effectLst/>
+              </a:rPr>
+              <a:t>(p= 5x10—36)</a:t>
             </a:r>
             <a:br>
               <a:rPr lang="en-US" sz="3700" dirty="0">
@@ -10721,7 +11052,7 @@
                   <a:srgbClr val="FFFF66"/>
                 </a:solidFill>
               </a:rPr>
-              <a:t>Brandon - Other</a:t>
+              <a:t>Summary</a:t>
             </a:r>
           </a:p>
         </p:txBody>
@@ -10744,8 +11075,8 @@
         </p:nvSpPr>
         <p:spPr>
           <a:xfrm>
-            <a:off x="0" y="787791"/>
-            <a:ext cx="11141612" cy="814008"/>
+            <a:off x="0" y="1330716"/>
+            <a:ext cx="12192000" cy="4441434"/>
           </a:xfrm>
         </p:spPr>
         <p:txBody>
@@ -10755,17 +11086,47 @@
           <a:lstStyle/>
           <a:p>
             <a:r>
-              <a:rPr lang="en-US" sz="2000" dirty="0" err="1"/>
-              <a:t>xyz</a:t>
-            </a:r>
-            <a:endParaRPr lang="en-US" sz="2000" dirty="0"/>
+              <a:rPr lang="en-US" sz="3200" b="1" dirty="0"/>
+              <a:t>Hypothesis 1: Correlating Population Density to Higher Procedure charges. </a:t>
+            </a:r>
+            <a:r>
+              <a:rPr lang="en-US" sz="3200" dirty="0">
+                <a:solidFill>
+                  <a:srgbClr val="00FF00"/>
+                </a:solidFill>
+              </a:rPr>
+              <a:t>TRUE Nationally </a:t>
+            </a:r>
+            <a:r>
+              <a:rPr lang="en-US" sz="2400" dirty="0">
+                <a:solidFill>
+                  <a:srgbClr val="00FF00"/>
+                </a:solidFill>
+              </a:rPr>
+              <a:t>(p=0.00002)  </a:t>
+            </a:r>
+            <a:r>
+              <a:rPr lang="en-US" sz="3200" dirty="0">
+                <a:solidFill>
+                  <a:srgbClr val="FF0000"/>
+                </a:solidFill>
+              </a:rPr>
+              <a:t>FALSE Locally</a:t>
+            </a:r>
+            <a:endParaRPr lang="en-US" sz="3200" b="1" dirty="0"/>
+          </a:p>
+          <a:p>
+            <a:r>
+              <a:rPr lang="en-US" sz="3200" b="1" dirty="0"/>
+              <a:t>Hypothesis 2: </a:t>
+            </a:r>
           </a:p>
         </p:txBody>
       </p:sp>
     </p:spTree>
     <p:extLst>
       <p:ext uri="{BB962C8B-B14F-4D97-AF65-F5344CB8AC3E}">
-        <p14:creationId xmlns:p14="http://schemas.microsoft.com/office/powerpoint/2010/main" val="3166318659"/>
+        <p14:creationId xmlns:p14="http://schemas.microsoft.com/office/powerpoint/2010/main" val="2045527951"/>
       </p:ext>
     </p:extLst>
   </p:cSld>
@@ -10832,7 +11193,7 @@
                   <a:srgbClr val="FFFF66"/>
                 </a:solidFill>
               </a:rPr>
-              <a:t>Tyler – Ranking, customer satisfaction</a:t>
+              <a:t>Observations &amp; Implications</a:t>
             </a:r>
           </a:p>
         </p:txBody>
@@ -10855,243 +11216,49 @@
         </p:nvSpPr>
         <p:spPr>
           <a:xfrm>
-            <a:off x="0" y="787791"/>
-            <a:ext cx="11141612" cy="814008"/>
+            <a:off x="0" y="1330716"/>
+            <a:ext cx="12192000" cy="4441434"/>
           </a:xfrm>
         </p:spPr>
         <p:txBody>
           <a:bodyPr>
-            <a:normAutofit/>
+            <a:normAutofit lnSpcReduction="10000"/>
           </a:bodyPr>
           <a:lstStyle/>
           <a:p>
             <a:r>
-              <a:rPr lang="en-US" sz="2000" dirty="0" err="1"/>
-              <a:t>xyz</a:t>
-            </a:r>
-            <a:endParaRPr lang="en-US" sz="2000" dirty="0"/>
-          </a:p>
-        </p:txBody>
-      </p:sp>
-    </p:spTree>
-    <p:extLst>
-      <p:ext uri="{BB962C8B-B14F-4D97-AF65-F5344CB8AC3E}">
-        <p14:creationId xmlns:p14="http://schemas.microsoft.com/office/powerpoint/2010/main" val="4197427627"/>
-      </p:ext>
-    </p:extLst>
-  </p:cSld>
-  <p:clrMapOvr>
-    <a:masterClrMapping/>
-  </p:clrMapOvr>
-  <mc:AlternateContent xmlns:mc="http://schemas.openxmlformats.org/markup-compatibility/2006" xmlns:p14="http://schemas.microsoft.com/office/powerpoint/2010/main">
-    <mc:Choice Requires="p14">
-      <p:transition spd="med" p14:dur="700">
-        <p:fade/>
-      </p:transition>
-    </mc:Choice>
-    <mc:Fallback xmlns="">
-      <p:transition spd="med">
-        <p:fade/>
-      </p:transition>
-    </mc:Fallback>
-  </mc:AlternateContent>
-</p:sld>
-</file>
-
-<file path=ppt/slides/slide24.xml><?xml version="1.0" encoding="utf-8"?>
-<p:sld xmlns:a="http://schemas.openxmlformats.org/drawingml/2006/main" xmlns:r="http://schemas.openxmlformats.org/officeDocument/2006/relationships" xmlns:p="http://schemas.openxmlformats.org/presentationml/2006/main">
-  <p:cSld>
-    <p:spTree>
-      <p:nvGrpSpPr>
-        <p:cNvPr id="1" name=""/>
-        <p:cNvGrpSpPr/>
-        <p:nvPr/>
-      </p:nvGrpSpPr>
-      <p:grpSpPr>
-        <a:xfrm>
-          <a:off x="0" y="0"/>
-          <a:ext cx="0" cy="0"/>
-          <a:chOff x="0" y="0"/>
-          <a:chExt cx="0" cy="0"/>
-        </a:xfrm>
-      </p:grpSpPr>
-      <p:sp>
-        <p:nvSpPr>
-          <p:cNvPr id="2" name="Title 1"/>
-          <p:cNvSpPr>
-            <a:spLocks noGrp="1"/>
-          </p:cNvSpPr>
-          <p:nvPr>
-            <p:ph type="title"/>
-          </p:nvPr>
-        </p:nvSpPr>
-        <p:spPr>
-          <a:xfrm>
-            <a:off x="429575" y="-165295"/>
-            <a:ext cx="11544886" cy="1143000"/>
-          </a:xfrm>
-        </p:spPr>
-        <p:txBody>
-          <a:bodyPr>
-            <a:normAutofit/>
-          </a:bodyPr>
-          <a:lstStyle/>
-          <a:p>
-            <a:r>
-              <a:rPr lang="en-US" dirty="0">
-                <a:solidFill>
-                  <a:srgbClr val="FFFF66"/>
-                </a:solidFill>
-              </a:rPr>
-              <a:t>Tyler – Hypothesis Testing</a:t>
-            </a:r>
-          </a:p>
-        </p:txBody>
-      </p:sp>
-      <p:sp>
-        <p:nvSpPr>
-          <p:cNvPr id="3" name="Content Placeholder 2">
-            <a:extLst>
-              <a:ext uri="{FF2B5EF4-FFF2-40B4-BE49-F238E27FC236}">
-                <a16:creationId xmlns:a16="http://schemas.microsoft.com/office/drawing/2014/main" id="{80C1BCAA-CD4B-49E7-9D8B-415B3E66ADF7}"/>
-              </a:ext>
-            </a:extLst>
-          </p:cNvPr>
-          <p:cNvSpPr>
-            <a:spLocks noGrp="1"/>
-          </p:cNvSpPr>
-          <p:nvPr>
-            <p:ph idx="1"/>
-          </p:nvPr>
-        </p:nvSpPr>
-        <p:spPr>
-          <a:xfrm>
-            <a:off x="0" y="787791"/>
-            <a:ext cx="11141612" cy="814008"/>
-          </a:xfrm>
-        </p:spPr>
-        <p:txBody>
-          <a:bodyPr>
-            <a:normAutofit/>
-          </a:bodyPr>
-          <a:lstStyle/>
-          <a:p>
-            <a:r>
-              <a:rPr lang="en-US" sz="2000" dirty="0" err="1"/>
-              <a:t>xyz</a:t>
-            </a:r>
-            <a:endParaRPr lang="en-US" sz="2000" dirty="0"/>
-          </a:p>
-        </p:txBody>
-      </p:sp>
-    </p:spTree>
-    <p:extLst>
-      <p:ext uri="{BB962C8B-B14F-4D97-AF65-F5344CB8AC3E}">
-        <p14:creationId xmlns:p14="http://schemas.microsoft.com/office/powerpoint/2010/main" val="3140958020"/>
-      </p:ext>
-    </p:extLst>
-  </p:cSld>
-  <p:clrMapOvr>
-    <a:masterClrMapping/>
-  </p:clrMapOvr>
-  <mc:AlternateContent xmlns:mc="http://schemas.openxmlformats.org/markup-compatibility/2006" xmlns:p14="http://schemas.microsoft.com/office/powerpoint/2010/main">
-    <mc:Choice Requires="p14">
-      <p:transition spd="med" p14:dur="700">
-        <p:fade/>
-      </p:transition>
-    </mc:Choice>
-    <mc:Fallback xmlns="">
-      <p:transition spd="med">
-        <p:fade/>
-      </p:transition>
-    </mc:Fallback>
-  </mc:AlternateContent>
-</p:sld>
-</file>
-
-<file path=ppt/slides/slide25.xml><?xml version="1.0" encoding="utf-8"?>
-<p:sld xmlns:a="http://schemas.openxmlformats.org/drawingml/2006/main" xmlns:r="http://schemas.openxmlformats.org/officeDocument/2006/relationships" xmlns:p="http://schemas.openxmlformats.org/presentationml/2006/main">
-  <p:cSld>
-    <p:spTree>
-      <p:nvGrpSpPr>
-        <p:cNvPr id="1" name=""/>
-        <p:cNvGrpSpPr/>
-        <p:nvPr/>
-      </p:nvGrpSpPr>
-      <p:grpSpPr>
-        <a:xfrm>
-          <a:off x="0" y="0"/>
-          <a:ext cx="0" cy="0"/>
-          <a:chOff x="0" y="0"/>
-          <a:chExt cx="0" cy="0"/>
-        </a:xfrm>
-      </p:grpSpPr>
-      <p:sp>
-        <p:nvSpPr>
-          <p:cNvPr id="2" name="Title 1"/>
-          <p:cNvSpPr>
-            <a:spLocks noGrp="1"/>
-          </p:cNvSpPr>
-          <p:nvPr>
-            <p:ph type="title"/>
-          </p:nvPr>
-        </p:nvSpPr>
-        <p:spPr>
-          <a:xfrm>
-            <a:off x="429575" y="-165295"/>
-            <a:ext cx="11544886" cy="1143000"/>
-          </a:xfrm>
-        </p:spPr>
-        <p:txBody>
-          <a:bodyPr>
-            <a:normAutofit/>
-          </a:bodyPr>
-          <a:lstStyle/>
-          <a:p>
-            <a:r>
-              <a:rPr lang="en-US" dirty="0">
-                <a:solidFill>
-                  <a:srgbClr val="FFFF66"/>
-                </a:solidFill>
-              </a:rPr>
-              <a:t>Summary</a:t>
-            </a:r>
-          </a:p>
-        </p:txBody>
-      </p:sp>
-      <p:sp>
-        <p:nvSpPr>
-          <p:cNvPr id="3" name="Content Placeholder 2">
-            <a:extLst>
-              <a:ext uri="{FF2B5EF4-FFF2-40B4-BE49-F238E27FC236}">
-                <a16:creationId xmlns:a16="http://schemas.microsoft.com/office/drawing/2014/main" id="{80C1BCAA-CD4B-49E7-9D8B-415B3E66ADF7}"/>
-              </a:ext>
-            </a:extLst>
-          </p:cNvPr>
-          <p:cNvSpPr>
-            <a:spLocks noGrp="1"/>
-          </p:cNvSpPr>
-          <p:nvPr>
-            <p:ph idx="1"/>
-          </p:nvPr>
-        </p:nvSpPr>
-        <p:spPr>
-          <a:xfrm>
-            <a:off x="0" y="787791"/>
-            <a:ext cx="11141612" cy="814008"/>
-          </a:xfrm>
-        </p:spPr>
-        <p:txBody>
-          <a:bodyPr>
-            <a:normAutofit/>
-          </a:bodyPr>
-          <a:lstStyle/>
-          <a:p>
-            <a:r>
-              <a:rPr lang="en-US" sz="2000" dirty="0" err="1"/>
-              <a:t>xyz</a:t>
-            </a:r>
-            <a:endParaRPr lang="en-US" sz="2000" dirty="0"/>
+              <a:rPr lang="en-US" sz="3200" b="1" dirty="0"/>
+              <a:t>Available data on procedure costs by DRG code is sparse and inconsistent</a:t>
+            </a:r>
+          </a:p>
+          <a:p>
+            <a:r>
+              <a:rPr lang="en-US" sz="3200" b="1" dirty="0"/>
+              <a:t>Outpatient DRG-coded data not immediately </a:t>
+            </a:r>
+            <a:r>
+              <a:rPr lang="en-US" sz="3200" b="1" dirty="0" err="1"/>
+              <a:t>avaialble</a:t>
+            </a:r>
+            <a:endParaRPr lang="en-US" sz="3200" b="1" dirty="0"/>
+          </a:p>
+          <a:p>
+            <a:r>
+              <a:rPr lang="en-US" sz="3200" b="1" dirty="0"/>
+              <a:t>Hospital Charges can vary wildly within a single healthcare provider in a single metro area – differing cost structures?</a:t>
+            </a:r>
+          </a:p>
+          <a:p>
+            <a:r>
+              <a:rPr lang="en-US" sz="3200" b="1" dirty="0"/>
+              <a:t>Expect the ‘List Price’ vs. ‘Medicare Price’ gap to significantly narrow in the future due to market forces </a:t>
+            </a:r>
+          </a:p>
+          <a:p>
+            <a:r>
+              <a:rPr lang="en-US" sz="3200" b="1" dirty="0"/>
+              <a:t>Consumers enabled to shop for quality and affordability in healthcare procedures</a:t>
+            </a:r>
           </a:p>
         </p:txBody>
       </p:sp>
@@ -11120,7 +11287,7 @@
 </p:sld>
 </file>
 
-<file path=ppt/slides/slide26.xml><?xml version="1.0" encoding="utf-8"?>
+<file path=ppt/slides/slide24.xml><?xml version="1.0" encoding="utf-8"?>
 <p:sld xmlns:a="http://schemas.openxmlformats.org/drawingml/2006/main" xmlns:r="http://schemas.openxmlformats.org/officeDocument/2006/relationships" xmlns:p="http://schemas.openxmlformats.org/presentationml/2006/main">
   <p:cSld>
     <p:spTree>
@@ -12642,11 +12809,60 @@
         </p:blipFill>
         <p:spPr>
           <a:xfrm>
-            <a:off x="1586487" y="2362893"/>
+            <a:off x="437321" y="2305764"/>
             <a:ext cx="8555195" cy="4277598"/>
           </a:xfrm>
         </p:spPr>
       </p:pic>
+      <p:sp>
+        <p:nvSpPr>
+          <p:cNvPr id="5" name="TextBox 4">
+            <a:extLst>
+              <a:ext uri="{FF2B5EF4-FFF2-40B4-BE49-F238E27FC236}">
+                <a16:creationId xmlns:a16="http://schemas.microsoft.com/office/drawing/2014/main" id="{974783B0-39AE-4AEE-ACFA-43311BDCC201}"/>
+              </a:ext>
+            </a:extLst>
+          </p:cNvPr>
+          <p:cNvSpPr txBox="1"/>
+          <p:nvPr/>
+        </p:nvSpPr>
+        <p:spPr>
+          <a:xfrm>
+            <a:off x="9613324" y="3429000"/>
+            <a:ext cx="2141355" cy="1600438"/>
+          </a:xfrm>
+          <a:prstGeom prst="rect">
+            <a:avLst/>
+          </a:prstGeom>
+          <a:noFill/>
+        </p:spPr>
+        <p:txBody>
+          <a:bodyPr wrap="none" rtlCol="0">
+            <a:spAutoFit/>
+          </a:bodyPr>
+          <a:lstStyle/>
+          <a:p>
+            <a:r>
+              <a:rPr lang="en-US" sz="6600" b="1" dirty="0">
+                <a:solidFill>
+                  <a:srgbClr val="00B050"/>
+                </a:solidFill>
+              </a:rPr>
+              <a:t>TRUE</a:t>
+            </a:r>
+          </a:p>
+          <a:p>
+            <a:r>
+              <a:rPr lang="en-US" sz="3200" b="1" dirty="0">
+                <a:solidFill>
+                  <a:srgbClr val="00B050"/>
+                </a:solidFill>
+              </a:rPr>
+              <a:t>(nationally)</a:t>
+            </a:r>
+          </a:p>
+        </p:txBody>
+      </p:sp>
     </p:spTree>
     <p:extLst>
       <p:ext uri="{BB962C8B-B14F-4D97-AF65-F5344CB8AC3E}">
@@ -12705,7 +12921,12 @@
             <p:ph type="title"/>
           </p:nvPr>
         </p:nvSpPr>
-        <p:spPr/>
+        <p:spPr>
+          <a:xfrm>
+            <a:off x="514350" y="0"/>
+            <a:ext cx="11163300" cy="1143000"/>
+          </a:xfrm>
+        </p:spPr>
         <p:txBody>
           <a:bodyPr>
             <a:normAutofit fontScale="90000"/>
@@ -12719,52 +12940,296 @@
                 </a:solidFill>
                 <a:effectLst/>
               </a:rPr>
-              <a:t>Hypothesis 1: There is a significant difference between population and medical procedure cost.</a:t>
+              <a:t>Hypothesis 2: There is a significant difference between hospital rating and the cost of medical procedures.</a:t>
             </a:r>
           </a:p>
         </p:txBody>
       </p:sp>
-      <p:pic>
-        <p:nvPicPr>
-          <p:cNvPr id="15" name="Content Placeholder 14">
+      <p:grpSp>
+        <p:nvGrpSpPr>
+          <p:cNvPr id="13" name="Group 12">
             <a:extLst>
               <a:ext uri="{FF2B5EF4-FFF2-40B4-BE49-F238E27FC236}">
-                <a16:creationId xmlns:a16="http://schemas.microsoft.com/office/drawing/2014/main" id="{39F1B883-A8D4-49AF-8401-BBAAFA25B54D}"/>
+                <a16:creationId xmlns:a16="http://schemas.microsoft.com/office/drawing/2014/main" id="{20F5430A-77AA-423E-85A0-FA7621D7AC6C}"/>
               </a:ext>
             </a:extLst>
           </p:cNvPr>
-          <p:cNvPicPr>
-            <a:picLocks noGrp="1" noChangeAspect="1"/>
-          </p:cNvPicPr>
-          <p:nvPr>
-            <p:ph idx="1"/>
-          </p:nvPr>
-        </p:nvPicPr>
-        <p:blipFill>
-          <a:blip r:embed="rId2">
-            <a:extLst>
-              <a:ext uri="{28A0092B-C50C-407E-A947-70E740481C1C}">
-                <a14:useLocalDpi xmlns:a14="http://schemas.microsoft.com/office/drawing/2010/main" val="0"/>
-              </a:ext>
-            </a:extLst>
-          </a:blip>
-          <a:stretch>
-            <a:fillRect/>
-          </a:stretch>
-        </p:blipFill>
-        <p:spPr>
+          <p:cNvGrpSpPr/>
+          <p:nvPr/>
+        </p:nvGrpSpPr>
+        <p:grpSpPr>
           <a:xfrm>
-            <a:off x="2017990" y="2505352"/>
-            <a:ext cx="8156020" cy="4078010"/>
+            <a:off x="1047750" y="1143000"/>
+            <a:ext cx="7400349" cy="5715000"/>
+            <a:chOff x="107998" y="1099168"/>
+            <a:chExt cx="7501901" cy="5758832"/>
           </a:xfrm>
-        </p:spPr>
-      </p:pic>
+        </p:grpSpPr>
+        <p:pic>
+          <p:nvPicPr>
+            <p:cNvPr id="8" name="Picture 7" descr="A close up of a map&#10;&#10;Description automatically generated">
+              <a:extLst>
+                <a:ext uri="{FF2B5EF4-FFF2-40B4-BE49-F238E27FC236}">
+                  <a16:creationId xmlns:a16="http://schemas.microsoft.com/office/drawing/2014/main" id="{375A9450-F23C-405C-86CB-9D6963235C23}"/>
+                </a:ext>
+              </a:extLst>
+            </p:cNvPr>
+            <p:cNvPicPr>
+              <a:picLocks noChangeAspect="1"/>
+            </p:cNvPicPr>
+            <p:nvPr/>
+          </p:nvPicPr>
+          <p:blipFill>
+            <a:blip r:embed="rId2">
+              <a:extLst>
+                <a:ext uri="{28A0092B-C50C-407E-A947-70E740481C1C}">
+                  <a14:useLocalDpi xmlns:a14="http://schemas.microsoft.com/office/drawing/2010/main" val="0"/>
+                </a:ext>
+              </a:extLst>
+            </a:blip>
+            <a:stretch>
+              <a:fillRect/>
+            </a:stretch>
+          </p:blipFill>
+          <p:spPr>
+            <a:xfrm>
+              <a:off x="107998" y="1099168"/>
+              <a:ext cx="7501901" cy="5001267"/>
+            </a:xfrm>
+            <a:prstGeom prst="rect">
+              <a:avLst/>
+            </a:prstGeom>
+          </p:spPr>
+        </p:pic>
+        <p:sp>
+          <p:nvSpPr>
+            <p:cNvPr id="12" name="Rectangle 3">
+              <a:extLst>
+                <a:ext uri="{FF2B5EF4-FFF2-40B4-BE49-F238E27FC236}">
+                  <a16:creationId xmlns:a16="http://schemas.microsoft.com/office/drawing/2014/main" id="{713B174D-D8A5-4D69-8118-C01745AB7A88}"/>
+                </a:ext>
+              </a:extLst>
+            </p:cNvPr>
+            <p:cNvSpPr>
+              <a:spLocks noChangeArrowheads="1"/>
+            </p:cNvSpPr>
+            <p:nvPr/>
+          </p:nvSpPr>
+          <p:spPr bwMode="auto">
+            <a:xfrm>
+              <a:off x="107998" y="5903893"/>
+              <a:ext cx="7501901" cy="954107"/>
+            </a:xfrm>
+            <a:prstGeom prst="rect">
+              <a:avLst/>
+            </a:prstGeom>
+            <a:solidFill>
+              <a:schemeClr val="tx1"/>
+            </a:solidFill>
+            <a:ln>
+              <a:noFill/>
+            </a:ln>
+            <a:effectLst/>
+          </p:spPr>
+          <p:txBody>
+            <a:bodyPr vert="horz" wrap="square" lIns="91440" tIns="45720" rIns="91440" bIns="45720" numCol="1" anchor="ctr" anchorCtr="0" compatLnSpc="1">
+              <a:prstTxWarp prst="textNoShape">
+                <a:avLst/>
+              </a:prstTxWarp>
+              <a:spAutoFit/>
+            </a:bodyPr>
+            <a:lstStyle/>
+            <a:p>
+              <a:pPr marL="0" marR="0" lvl="0" indent="0" algn="l" defTabSz="914400" rtl="0" eaLnBrk="0" fontAlgn="base" latinLnBrk="0" hangingPunct="0">
+                <a:lnSpc>
+                  <a:spcPct val="100000"/>
+                </a:lnSpc>
+                <a:spcBef>
+                  <a:spcPct val="0"/>
+                </a:spcBef>
+                <a:spcAft>
+                  <a:spcPct val="0"/>
+                </a:spcAft>
+                <a:buClrTx/>
+                <a:buSzTx/>
+                <a:buFontTx/>
+                <a:buNone/>
+                <a:tabLst/>
+              </a:pPr>
+              <a:r>
+                <a:rPr kumimoji="0" lang="en-US" altLang="en-US" sz="1400" b="0" i="0" u="none" strike="noStrike" cap="none" normalizeH="0" baseline="0" dirty="0">
+                  <a:ln>
+                    <a:noFill/>
+                  </a:ln>
+                  <a:solidFill>
+                    <a:schemeClr val="bg1"/>
+                  </a:solidFill>
+                  <a:effectLst/>
+                  <a:latin typeface="Arial Unicode MS"/>
+                </a:rPr>
+                <a:t>T-Test: T-Value = -73.18081389444465, </a:t>
+              </a:r>
+              <a:r>
+                <a:rPr kumimoji="0" lang="en-US" altLang="en-US" sz="1400" b="0" i="0" u="none" strike="noStrike" cap="none" normalizeH="0" baseline="0" dirty="0" err="1">
+                  <a:ln>
+                    <a:noFill/>
+                  </a:ln>
+                  <a:solidFill>
+                    <a:schemeClr val="bg1"/>
+                  </a:solidFill>
+                  <a:effectLst/>
+                  <a:latin typeface="Arial Unicode MS"/>
+                </a:rPr>
+                <a:t>pvalue</a:t>
+              </a:r>
+              <a:r>
+                <a:rPr kumimoji="0" lang="en-US" altLang="en-US" sz="1400" b="0" i="0" u="none" strike="noStrike" cap="none" normalizeH="0" baseline="0" dirty="0">
+                  <a:ln>
+                    <a:noFill/>
+                  </a:ln>
+                  <a:solidFill>
+                    <a:schemeClr val="bg1"/>
+                  </a:solidFill>
+                  <a:effectLst/>
+                  <a:latin typeface="Arial Unicode MS"/>
+                </a:rPr>
+                <a:t> = 0.0 </a:t>
+              </a:r>
+            </a:p>
+            <a:p>
+              <a:pPr marL="0" marR="0" lvl="0" indent="0" algn="l" defTabSz="914400" rtl="0" eaLnBrk="0" fontAlgn="base" latinLnBrk="0" hangingPunct="0">
+                <a:lnSpc>
+                  <a:spcPct val="100000"/>
+                </a:lnSpc>
+                <a:spcBef>
+                  <a:spcPct val="0"/>
+                </a:spcBef>
+                <a:spcAft>
+                  <a:spcPct val="0"/>
+                </a:spcAft>
+                <a:buClrTx/>
+                <a:buSzTx/>
+                <a:buFontTx/>
+                <a:buNone/>
+                <a:tabLst/>
+              </a:pPr>
+              <a:r>
+                <a:rPr kumimoji="0" lang="en-US" altLang="en-US" sz="1400" b="0" i="0" u="none" strike="noStrike" cap="none" normalizeH="0" baseline="0" dirty="0">
+                  <a:ln>
+                    <a:noFill/>
+                  </a:ln>
+                  <a:solidFill>
+                    <a:schemeClr val="bg1"/>
+                  </a:solidFill>
+                  <a:effectLst/>
+                  <a:latin typeface="Arial Unicode MS"/>
+                </a:rPr>
+                <a:t>Linear Regression: Slope = -247.8486204326963, Intercept = 39475.26258752547</a:t>
+              </a:r>
+            </a:p>
+            <a:p>
+              <a:pPr marL="0" marR="0" lvl="0" indent="0" algn="l" defTabSz="914400" rtl="0" eaLnBrk="0" fontAlgn="base" latinLnBrk="0" hangingPunct="0">
+                <a:lnSpc>
+                  <a:spcPct val="100000"/>
+                </a:lnSpc>
+                <a:spcBef>
+                  <a:spcPct val="0"/>
+                </a:spcBef>
+                <a:spcAft>
+                  <a:spcPct val="0"/>
+                </a:spcAft>
+                <a:buClrTx/>
+                <a:buSzTx/>
+                <a:buFontTx/>
+                <a:buNone/>
+                <a:tabLst/>
+              </a:pPr>
+              <a:r>
+                <a:rPr lang="en-US" altLang="en-US" sz="1400" dirty="0">
+                  <a:solidFill>
+                    <a:schemeClr val="bg1"/>
+                  </a:solidFill>
+                  <a:latin typeface="Arial Unicode MS"/>
+                </a:rPr>
+                <a:t>	             </a:t>
+              </a:r>
+              <a:r>
+                <a:rPr kumimoji="0" lang="en-US" altLang="en-US" sz="1400" b="0" i="0" u="none" strike="noStrike" cap="none" normalizeH="0" baseline="0" dirty="0" err="1">
+                  <a:ln>
+                    <a:noFill/>
+                  </a:ln>
+                  <a:solidFill>
+                    <a:schemeClr val="bg1"/>
+                  </a:solidFill>
+                  <a:effectLst/>
+                  <a:latin typeface="Arial Unicode MS"/>
+                </a:rPr>
+                <a:t>Pvalue</a:t>
+              </a:r>
+              <a:r>
+                <a:rPr kumimoji="0" lang="en-US" altLang="en-US" sz="1400" b="0" i="0" u="none" strike="noStrike" cap="none" normalizeH="0" baseline="0" dirty="0">
+                  <a:ln>
+                    <a:noFill/>
+                  </a:ln>
+                  <a:solidFill>
+                    <a:schemeClr val="bg1"/>
+                  </a:solidFill>
+                  <a:effectLst/>
+                  <a:latin typeface="Arial Unicode MS"/>
+                </a:rPr>
+                <a:t> = 5.870203165162494e-36, R^2=0.09468995132269074 </a:t>
+              </a:r>
+            </a:p>
+            <a:p>
+              <a:pPr marL="0" marR="0" lvl="0" indent="0" algn="l" defTabSz="914400" rtl="0" eaLnBrk="0" fontAlgn="base" latinLnBrk="0" hangingPunct="0">
+                <a:lnSpc>
+                  <a:spcPct val="100000"/>
+                </a:lnSpc>
+                <a:spcBef>
+                  <a:spcPct val="0"/>
+                </a:spcBef>
+                <a:spcAft>
+                  <a:spcPct val="0"/>
+                </a:spcAft>
+                <a:buClrTx/>
+                <a:buSzTx/>
+                <a:buFontTx/>
+                <a:buNone/>
+                <a:tabLst/>
+              </a:pPr>
+              <a:r>
+                <a:rPr kumimoji="0" lang="en-US" altLang="en-US" sz="1400" b="0" i="0" u="none" strike="noStrike" cap="none" normalizeH="0" baseline="0" dirty="0">
+                  <a:ln>
+                    <a:noFill/>
+                  </a:ln>
+                  <a:solidFill>
+                    <a:schemeClr val="bg1"/>
+                  </a:solidFill>
+                  <a:effectLst/>
+                  <a:latin typeface="Arial Unicode MS"/>
+                </a:rPr>
+                <a:t>Polynomial Regression: -247.8 x + 3.948e+04 [ -247.84862043 39475.26258753] </a:t>
+              </a:r>
+              <a:endParaRPr kumimoji="0" lang="en-US" altLang="en-US" sz="3200" b="0" i="0" u="none" strike="noStrike" cap="none" normalizeH="0" baseline="0" dirty="0">
+                <a:ln>
+                  <a:noFill/>
+                </a:ln>
+                <a:solidFill>
+                  <a:schemeClr val="bg1"/>
+                </a:solidFill>
+                <a:effectLst/>
+                <a:latin typeface="Arial" panose="020B0604020202020204" pitchFamily="34" charset="0"/>
+              </a:endParaRPr>
+            </a:p>
+          </p:txBody>
+        </p:sp>
+      </p:grpSp>
       <p:sp>
         <p:nvSpPr>
-          <p:cNvPr id="16" name="TextBox 15">
+          <p:cNvPr id="14" name="TextBox 13">
             <a:extLst>
               <a:ext uri="{FF2B5EF4-FFF2-40B4-BE49-F238E27FC236}">
-                <a16:creationId xmlns:a16="http://schemas.microsoft.com/office/drawing/2014/main" id="{B90643FB-6118-42B2-866E-1B54F76F3EB0}"/>
+                <a16:creationId xmlns:a16="http://schemas.microsoft.com/office/drawing/2014/main" id="{6B356393-3228-4ED3-9311-68D3928D8934}"/>
               </a:ext>
             </a:extLst>
           </p:cNvPr>
@@ -12773,8 +13238,8 @@
         </p:nvSpPr>
         <p:spPr>
           <a:xfrm>
-            <a:off x="2017990" y="1499830"/>
-            <a:ext cx="7989903" cy="923330"/>
+            <a:off x="9144000" y="2824381"/>
+            <a:ext cx="2141355" cy="1600438"/>
           </a:xfrm>
           <a:prstGeom prst="rect">
             <a:avLst/>
@@ -12782,18 +13247,28 @@
           <a:noFill/>
         </p:spPr>
         <p:txBody>
-          <a:bodyPr wrap="square" rtlCol="0" anchor="ctr">
+          <a:bodyPr wrap="none" rtlCol="0">
             <a:spAutoFit/>
           </a:bodyPr>
           <a:lstStyle/>
           <a:p>
-            <a:pPr marL="285750" indent="-285750">
-              <a:buFont typeface="Arial" panose="020B0604020202020204" pitchFamily="34" charset="0"/>
-              <a:buChar char="•"/>
-            </a:pPr>
-            <a:r>
-              <a:rPr lang="en-US" dirty="0"/>
-              <a:t>New York shows a significant trend when looking at hip/knee replacements across the state.   More populated areas tend to have higher costs for the same procedure</a:t>
+            <a:r>
+              <a:rPr lang="en-US" sz="6600" b="1" dirty="0">
+                <a:solidFill>
+                  <a:srgbClr val="00B050"/>
+                </a:solidFill>
+              </a:rPr>
+              <a:t>TRUE</a:t>
+            </a:r>
+          </a:p>
+          <a:p>
+            <a:r>
+              <a:rPr lang="en-US" sz="3200" b="1" dirty="0">
+                <a:solidFill>
+                  <a:srgbClr val="00B050"/>
+                </a:solidFill>
+              </a:rPr>
+              <a:t>(nationally)</a:t>
             </a:r>
           </a:p>
         </p:txBody>
@@ -12801,7 +13276,7 @@
     </p:spTree>
     <p:extLst>
       <p:ext uri="{BB962C8B-B14F-4D97-AF65-F5344CB8AC3E}">
-        <p14:creationId xmlns:p14="http://schemas.microsoft.com/office/powerpoint/2010/main" val="599695841"/>
+        <p14:creationId xmlns:p14="http://schemas.microsoft.com/office/powerpoint/2010/main" val="2383658963"/>
       </p:ext>
     </p:extLst>
   </p:cSld>
@@ -12842,7 +13317,13 @@
       </p:grpSpPr>
       <p:sp>
         <p:nvSpPr>
-          <p:cNvPr id="2" name="Title 1"/>
+          <p:cNvPr id="3" name="Title 2">
+            <a:extLst>
+              <a:ext uri="{FF2B5EF4-FFF2-40B4-BE49-F238E27FC236}">
+                <a16:creationId xmlns:a16="http://schemas.microsoft.com/office/drawing/2014/main" id="{4F2C0421-67C2-468C-8B70-C820462BFD0D}"/>
+              </a:ext>
+            </a:extLst>
+          </p:cNvPr>
           <p:cNvSpPr>
             <a:spLocks noGrp="1"/>
           </p:cNvSpPr>
@@ -12850,12 +13331,7 @@
             <p:ph type="title"/>
           </p:nvPr>
         </p:nvSpPr>
-        <p:spPr>
-          <a:xfrm>
-            <a:off x="404191" y="-1"/>
-            <a:ext cx="11570371" cy="1287481"/>
-          </a:xfrm>
-        </p:spPr>
+        <p:spPr/>
         <p:txBody>
           <a:bodyPr>
             <a:normAutofit fontScale="90000"/>
@@ -12869,427 +13345,139 @@
                 </a:solidFill>
                 <a:effectLst/>
               </a:rPr>
-              <a:t>Hypothesis 1a: There is a significant difference between population(density) and medical procedure cost.</a:t>
-            </a:r>
-            <a:endParaRPr lang="en-US" dirty="0">
-              <a:solidFill>
-                <a:srgbClr val="FFFF66"/>
-              </a:solidFill>
-            </a:endParaRPr>
+              <a:t>Hypothesis 1: There is a significant difference between population and medical procedure cost.</a:t>
+            </a:r>
+          </a:p>
+        </p:txBody>
+      </p:sp>
+      <p:pic>
+        <p:nvPicPr>
+          <p:cNvPr id="15" name="Content Placeholder 14">
+            <a:extLst>
+              <a:ext uri="{FF2B5EF4-FFF2-40B4-BE49-F238E27FC236}">
+                <a16:creationId xmlns:a16="http://schemas.microsoft.com/office/drawing/2014/main" id="{39F1B883-A8D4-49AF-8401-BBAAFA25B54D}"/>
+              </a:ext>
+            </a:extLst>
+          </p:cNvPr>
+          <p:cNvPicPr>
+            <a:picLocks noGrp="1" noChangeAspect="1"/>
+          </p:cNvPicPr>
+          <p:nvPr>
+            <p:ph idx="1"/>
+          </p:nvPr>
+        </p:nvPicPr>
+        <p:blipFill>
+          <a:blip r:embed="rId2">
+            <a:extLst>
+              <a:ext uri="{28A0092B-C50C-407E-A947-70E740481C1C}">
+                <a14:useLocalDpi xmlns:a14="http://schemas.microsoft.com/office/drawing/2010/main" val="0"/>
+              </a:ext>
+            </a:extLst>
+          </a:blip>
+          <a:stretch>
+            <a:fillRect/>
+          </a:stretch>
+        </p:blipFill>
+        <p:spPr>
+          <a:xfrm>
+            <a:off x="398740" y="2505352"/>
+            <a:ext cx="8156020" cy="4078010"/>
+          </a:xfrm>
+        </p:spPr>
+      </p:pic>
+      <p:sp>
+        <p:nvSpPr>
+          <p:cNvPr id="16" name="TextBox 15">
+            <a:extLst>
+              <a:ext uri="{FF2B5EF4-FFF2-40B4-BE49-F238E27FC236}">
+                <a16:creationId xmlns:a16="http://schemas.microsoft.com/office/drawing/2014/main" id="{B90643FB-6118-42B2-866E-1B54F76F3EB0}"/>
+              </a:ext>
+            </a:extLst>
+          </p:cNvPr>
+          <p:cNvSpPr txBox="1"/>
+          <p:nvPr/>
+        </p:nvSpPr>
+        <p:spPr>
+          <a:xfrm>
+            <a:off x="265390" y="1412518"/>
+            <a:ext cx="7989903" cy="923330"/>
+          </a:xfrm>
+          <a:prstGeom prst="rect">
+            <a:avLst/>
+          </a:prstGeom>
+          <a:noFill/>
+        </p:spPr>
+        <p:txBody>
+          <a:bodyPr wrap="square" rtlCol="0" anchor="ctr">
+            <a:spAutoFit/>
+          </a:bodyPr>
+          <a:lstStyle/>
+          <a:p>
+            <a:pPr marL="285750" indent="-285750">
+              <a:buFont typeface="Arial" panose="020B0604020202020204" pitchFamily="34" charset="0"/>
+              <a:buChar char="•"/>
+            </a:pPr>
+            <a:r>
+              <a:rPr lang="en-US" dirty="0"/>
+              <a:t>New York shows a significant trend when looking at hip/knee replacements across the state.   More populated areas tend to have higher costs for the same procedure</a:t>
+            </a:r>
           </a:p>
         </p:txBody>
       </p:sp>
       <p:sp>
         <p:nvSpPr>
-          <p:cNvPr id="3" name="Content Placeholder 2">
+          <p:cNvPr id="5" name="TextBox 4">
             <a:extLst>
               <a:ext uri="{FF2B5EF4-FFF2-40B4-BE49-F238E27FC236}">
-                <a16:creationId xmlns:a16="http://schemas.microsoft.com/office/drawing/2014/main" id="{80C1BCAA-CD4B-49E7-9D8B-415B3E66ADF7}"/>
+                <a16:creationId xmlns:a16="http://schemas.microsoft.com/office/drawing/2014/main" id="{A8B79AC1-7A60-40F9-8E2B-85EBBC7D1A3D}"/>
               </a:ext>
             </a:extLst>
           </p:cNvPr>
-          <p:cNvSpPr>
-            <a:spLocks noGrp="1"/>
-          </p:cNvSpPr>
-          <p:nvPr>
-            <p:ph idx="1"/>
-          </p:nvPr>
+          <p:cNvSpPr txBox="1"/>
+          <p:nvPr/>
         </p:nvSpPr>
         <p:spPr>
           <a:xfrm>
-            <a:off x="12028" y="1284937"/>
-            <a:ext cx="11570371" cy="769441"/>
+            <a:off x="9441045" y="3429000"/>
+            <a:ext cx="2045753" cy="1600438"/>
           </a:xfrm>
+          <a:prstGeom prst="rect">
+            <a:avLst/>
+          </a:prstGeom>
+          <a:noFill/>
         </p:spPr>
         <p:txBody>
-          <a:bodyPr>
-            <a:normAutofit fontScale="55000" lnSpcReduction="20000"/>
+          <a:bodyPr wrap="none" rtlCol="0">
+            <a:spAutoFit/>
           </a:bodyPr>
           <a:lstStyle/>
           <a:p>
             <a:r>
-              <a:rPr lang="en-US" dirty="0"/>
-              <a:t>Examining Mississippi – The statistics </a:t>
-            </a:r>
-            <a:r>
-              <a:rPr lang="en-US" b="1" u="sng" dirty="0"/>
-              <a:t>fail </a:t>
-            </a:r>
-            <a:r>
-              <a:rPr lang="en-US" dirty="0"/>
-              <a:t>to prove the hypothesis. </a:t>
-            </a:r>
-          </a:p>
-          <a:p>
-            <a:r>
-              <a:rPr lang="en-US" dirty="0"/>
-              <a:t>T-Test: The groups are not correlated as evidenced by high-T magnitude with good confidence (very low p-value)</a:t>
-            </a:r>
-          </a:p>
-          <a:p>
-            <a:r>
-              <a:rPr lang="en-US" dirty="0"/>
-              <a:t>Linear Regression: high p-value and low R^2 indicate bad fit. Polynomial fit not good</a:t>
+              <a:rPr lang="en-US" sz="6600" b="1" dirty="0">
+                <a:solidFill>
+                  <a:srgbClr val="00B050"/>
+                </a:solidFill>
+              </a:rPr>
+              <a:t>TRUE</a:t>
+            </a:r>
+          </a:p>
+          <a:p>
+            <a:pPr algn="ctr"/>
+            <a:r>
+              <a:rPr lang="en-US" sz="3200" b="1" dirty="0">
+                <a:solidFill>
+                  <a:srgbClr val="00B050"/>
+                </a:solidFill>
+              </a:rPr>
+              <a:t>(NY)</a:t>
             </a:r>
           </a:p>
         </p:txBody>
       </p:sp>
-      <p:grpSp>
-        <p:nvGrpSpPr>
-          <p:cNvPr id="13" name="Group 12">
-            <a:extLst>
-              <a:ext uri="{FF2B5EF4-FFF2-40B4-BE49-F238E27FC236}">
-                <a16:creationId xmlns:a16="http://schemas.microsoft.com/office/drawing/2014/main" id="{08237700-3102-4724-AB64-B34D5CFB56F8}"/>
-              </a:ext>
-            </a:extLst>
-          </p:cNvPr>
-          <p:cNvGrpSpPr/>
-          <p:nvPr/>
-        </p:nvGrpSpPr>
-        <p:grpSpPr>
-          <a:xfrm>
-            <a:off x="6300158" y="2148423"/>
-            <a:ext cx="5488964" cy="4427874"/>
-            <a:chOff x="6300158" y="2148423"/>
-            <a:chExt cx="5488964" cy="4427874"/>
-          </a:xfrm>
-        </p:grpSpPr>
-        <p:pic>
-          <p:nvPicPr>
-            <p:cNvPr id="8" name="Picture 7" descr="A screenshot of a cell phone&#10;&#10;Description automatically generated">
-              <a:extLst>
-                <a:ext uri="{FF2B5EF4-FFF2-40B4-BE49-F238E27FC236}">
-                  <a16:creationId xmlns:a16="http://schemas.microsoft.com/office/drawing/2014/main" id="{F12F32C6-3B6B-4463-B9FC-73E7D30C4DD1}"/>
-                </a:ext>
-              </a:extLst>
-            </p:cNvPr>
-            <p:cNvPicPr>
-              <a:picLocks noChangeAspect="1"/>
-            </p:cNvPicPr>
-            <p:nvPr/>
-          </p:nvPicPr>
-          <p:blipFill>
-            <a:blip r:embed="rId2">
-              <a:extLst>
-                <a:ext uri="{28A0092B-C50C-407E-A947-70E740481C1C}">
-                  <a14:useLocalDpi xmlns:a14="http://schemas.microsoft.com/office/drawing/2010/main" val="0"/>
-                </a:ext>
-              </a:extLst>
-            </a:blip>
-            <a:stretch>
-              <a:fillRect/>
-            </a:stretch>
-          </p:blipFill>
-          <p:spPr>
-            <a:xfrm>
-              <a:off x="6300158" y="2148423"/>
-              <a:ext cx="5487650" cy="3658433"/>
-            </a:xfrm>
-            <a:prstGeom prst="rect">
-              <a:avLst/>
-            </a:prstGeom>
-          </p:spPr>
-        </p:pic>
-        <p:sp>
-          <p:nvSpPr>
-            <p:cNvPr id="10" name="TextBox 9">
-              <a:extLst>
-                <a:ext uri="{FF2B5EF4-FFF2-40B4-BE49-F238E27FC236}">
-                  <a16:creationId xmlns:a16="http://schemas.microsoft.com/office/drawing/2014/main" id="{A850DBD7-271D-4A7C-82BC-838169624B84}"/>
-                </a:ext>
-              </a:extLst>
-            </p:cNvPr>
-            <p:cNvSpPr txBox="1"/>
-            <p:nvPr/>
-          </p:nvSpPr>
-          <p:spPr>
-            <a:xfrm>
-              <a:off x="6300158" y="5806856"/>
-              <a:ext cx="5488964" cy="769441"/>
-            </a:xfrm>
-            <a:prstGeom prst="rect">
-              <a:avLst/>
-            </a:prstGeom>
-            <a:solidFill>
-              <a:schemeClr val="tx1"/>
-            </a:solidFill>
-          </p:spPr>
-          <p:txBody>
-            <a:bodyPr wrap="square" rtlCol="0">
-              <a:spAutoFit/>
-            </a:bodyPr>
-            <a:lstStyle/>
-            <a:p>
-              <a:r>
-                <a:rPr lang="en-US" sz="1100" dirty="0">
-                  <a:solidFill>
-                    <a:schemeClr val="tx2">
-                      <a:lumMod val="10000"/>
-                    </a:schemeClr>
-                  </a:solidFill>
-                </a:rPr>
-                <a:t>T-Test: T-Value = -7.330113910577341, </a:t>
-              </a:r>
-              <a:r>
-                <a:rPr lang="en-US" sz="1100" dirty="0" err="1">
-                  <a:solidFill>
-                    <a:schemeClr val="tx2">
-                      <a:lumMod val="10000"/>
-                    </a:schemeClr>
-                  </a:solidFill>
-                </a:rPr>
-                <a:t>pvalue</a:t>
-              </a:r>
-              <a:r>
-                <a:rPr lang="en-US" sz="1100" dirty="0">
-                  <a:solidFill>
-                    <a:schemeClr val="tx2">
-                      <a:lumMod val="10000"/>
-                    </a:schemeClr>
-                  </a:solidFill>
-                </a:rPr>
-                <a:t> = 2.4202410480315282e-06</a:t>
-              </a:r>
-            </a:p>
-            <a:p>
-              <a:r>
-                <a:rPr lang="en-US" sz="1100" dirty="0">
-                  <a:solidFill>
-                    <a:schemeClr val="tx2">
-                      <a:lumMod val="10000"/>
-                    </a:schemeClr>
-                  </a:solidFill>
-                </a:rPr>
-                <a:t>Linear Regression: Slope = 2.387899055961176, Intercept = 25168.00982295613, </a:t>
-              </a:r>
-            </a:p>
-            <a:p>
-              <a:r>
-                <a:rPr lang="en-US" sz="1100" dirty="0">
-                  <a:solidFill>
-                    <a:schemeClr val="tx2">
-                      <a:lumMod val="10000"/>
-                    </a:schemeClr>
-                  </a:solidFill>
-                </a:rPr>
-                <a:t>	     </a:t>
-              </a:r>
-              <a:r>
-                <a:rPr lang="en-US" sz="1100" dirty="0" err="1">
-                  <a:solidFill>
-                    <a:schemeClr val="tx2">
-                      <a:lumMod val="10000"/>
-                    </a:schemeClr>
-                  </a:solidFill>
-                </a:rPr>
-                <a:t>Pvalue</a:t>
-              </a:r>
-              <a:r>
-                <a:rPr lang="en-US" sz="1100" dirty="0">
-                  <a:solidFill>
-                    <a:schemeClr val="tx2">
-                      <a:lumMod val="10000"/>
-                    </a:schemeClr>
-                  </a:solidFill>
-                </a:rPr>
-                <a:t> = 0.6779137724186564, R^2=0.012686186738626407</a:t>
-              </a:r>
-            </a:p>
-            <a:p>
-              <a:r>
-                <a:rPr lang="en-US" sz="1100" dirty="0">
-                  <a:solidFill>
-                    <a:schemeClr val="tx2">
-                      <a:lumMod val="10000"/>
-                    </a:schemeClr>
-                  </a:solidFill>
-                </a:rPr>
-                <a:t>Polynomial Regression:   -3.707e-08 x ^4+ 0.0001527 x^3 - 0.1875 x ^2+ 75.04 x + 1.955e+04</a:t>
-              </a:r>
-            </a:p>
-          </p:txBody>
-        </p:sp>
-      </p:grpSp>
-      <p:grpSp>
-        <p:nvGrpSpPr>
-          <p:cNvPr id="14" name="Group 13">
-            <a:extLst>
-              <a:ext uri="{FF2B5EF4-FFF2-40B4-BE49-F238E27FC236}">
-                <a16:creationId xmlns:a16="http://schemas.microsoft.com/office/drawing/2014/main" id="{C80B5D75-1A09-4F51-9EBD-0095D3BCD201}"/>
-              </a:ext>
-            </a:extLst>
-          </p:cNvPr>
-          <p:cNvGrpSpPr/>
-          <p:nvPr/>
-        </p:nvGrpSpPr>
-        <p:grpSpPr>
-          <a:xfrm>
-            <a:off x="309564" y="2148423"/>
-            <a:ext cx="5487650" cy="4428290"/>
-            <a:chOff x="309564" y="2148423"/>
-            <a:chExt cx="5487650" cy="4428290"/>
-          </a:xfrm>
-        </p:grpSpPr>
-        <p:pic>
-          <p:nvPicPr>
-            <p:cNvPr id="5" name="Picture 4" descr="A screenshot of a cell phone&#10;&#10;Description automatically generated">
-              <a:extLst>
-                <a:ext uri="{FF2B5EF4-FFF2-40B4-BE49-F238E27FC236}">
-                  <a16:creationId xmlns:a16="http://schemas.microsoft.com/office/drawing/2014/main" id="{653FAD42-04CB-4AF9-A1BF-AC12BFA4C94F}"/>
-                </a:ext>
-              </a:extLst>
-            </p:cNvPr>
-            <p:cNvPicPr>
-              <a:picLocks noChangeAspect="1"/>
-            </p:cNvPicPr>
-            <p:nvPr/>
-          </p:nvPicPr>
-          <p:blipFill>
-            <a:blip r:embed="rId3">
-              <a:extLst>
-                <a:ext uri="{28A0092B-C50C-407E-A947-70E740481C1C}">
-                  <a14:useLocalDpi xmlns:a14="http://schemas.microsoft.com/office/drawing/2010/main" val="0"/>
-                </a:ext>
-              </a:extLst>
-            </a:blip>
-            <a:stretch>
-              <a:fillRect/>
-            </a:stretch>
-          </p:blipFill>
-          <p:spPr>
-            <a:xfrm>
-              <a:off x="309564" y="2148423"/>
-              <a:ext cx="5487650" cy="3658433"/>
-            </a:xfrm>
-            <a:prstGeom prst="rect">
-              <a:avLst/>
-            </a:prstGeom>
-          </p:spPr>
-        </p:pic>
-        <p:sp>
-          <p:nvSpPr>
-            <p:cNvPr id="11" name="TextBox 10">
-              <a:extLst>
-                <a:ext uri="{FF2B5EF4-FFF2-40B4-BE49-F238E27FC236}">
-                  <a16:creationId xmlns:a16="http://schemas.microsoft.com/office/drawing/2014/main" id="{F5635036-439F-480E-9C24-8F89F70B2F04}"/>
-                </a:ext>
-              </a:extLst>
-            </p:cNvPr>
-            <p:cNvSpPr txBox="1"/>
-            <p:nvPr/>
-          </p:nvSpPr>
-          <p:spPr>
-            <a:xfrm>
-              <a:off x="309832" y="5807272"/>
-              <a:ext cx="5487382" cy="769441"/>
-            </a:xfrm>
-            <a:prstGeom prst="rect">
-              <a:avLst/>
-            </a:prstGeom>
-            <a:solidFill>
-              <a:schemeClr val="tx1"/>
-            </a:solidFill>
-          </p:spPr>
-          <p:txBody>
-            <a:bodyPr wrap="square" rtlCol="0">
-              <a:spAutoFit/>
-            </a:bodyPr>
-            <a:lstStyle/>
-            <a:p>
-              <a:r>
-                <a:rPr lang="en-US" sz="1100" dirty="0">
-                  <a:solidFill>
-                    <a:schemeClr val="tx2">
-                      <a:lumMod val="10000"/>
-                    </a:schemeClr>
-                  </a:solidFill>
-                </a:rPr>
-                <a:t>T-Test: T-Value = -8.435976191821668, </a:t>
-              </a:r>
-              <a:r>
-                <a:rPr lang="en-US" sz="1100" dirty="0" err="1">
-                  <a:solidFill>
-                    <a:schemeClr val="tx2">
-                      <a:lumMod val="10000"/>
-                    </a:schemeClr>
-                  </a:solidFill>
-                </a:rPr>
-                <a:t>pvalue</a:t>
-              </a:r>
-              <a:r>
-                <a:rPr lang="en-US" sz="1100" dirty="0">
-                  <a:solidFill>
-                    <a:schemeClr val="tx2">
-                      <a:lumMod val="10000"/>
-                    </a:schemeClr>
-                  </a:solidFill>
-                </a:rPr>
-                <a:t> = 2.4096964561007347e-08</a:t>
-              </a:r>
-            </a:p>
-            <a:p>
-              <a:r>
-                <a:rPr lang="en-US" sz="1100" dirty="0">
-                  <a:solidFill>
-                    <a:schemeClr val="tx2">
-                      <a:lumMod val="10000"/>
-                    </a:schemeClr>
-                  </a:solidFill>
-                </a:rPr>
-                <a:t>Linear Regression: Slope = 2.8376244389968734, Intercept = 65167.56099879802, </a:t>
-              </a:r>
-            </a:p>
-            <a:p>
-              <a:r>
-                <a:rPr lang="en-US" sz="1100" dirty="0">
-                  <a:solidFill>
-                    <a:schemeClr val="tx2">
-                      <a:lumMod val="10000"/>
-                    </a:schemeClr>
-                  </a:solidFill>
-                </a:rPr>
-                <a:t>	     </a:t>
-              </a:r>
-              <a:r>
-                <a:rPr lang="en-US" sz="1100" dirty="0" err="1">
-                  <a:solidFill>
-                    <a:schemeClr val="tx2">
-                      <a:lumMod val="10000"/>
-                    </a:schemeClr>
-                  </a:solidFill>
-                </a:rPr>
-                <a:t>Pvalue</a:t>
-              </a:r>
-              <a:r>
-                <a:rPr lang="en-US" sz="1100" dirty="0">
-                  <a:solidFill>
-                    <a:schemeClr val="tx2">
-                      <a:lumMod val="10000"/>
-                    </a:schemeClr>
-                  </a:solidFill>
-                </a:rPr>
-                <a:t> = 0.8381376720055401, R^2=0.002032867482902925</a:t>
-              </a:r>
-            </a:p>
-            <a:p>
-              <a:r>
-                <a:rPr lang="en-US" sz="1100" dirty="0">
-                  <a:solidFill>
-                    <a:schemeClr val="tx2">
-                      <a:lumMod val="10000"/>
-                    </a:schemeClr>
-                  </a:solidFill>
-                </a:rPr>
-                <a:t>Polynomial Regression: -6.902e-08 x ^4+ 0.0003221 x ^3- 0.4963 x^2 + 279.9 x + 3.305e+04</a:t>
-              </a:r>
-            </a:p>
-          </p:txBody>
-        </p:sp>
-      </p:grpSp>
     </p:spTree>
     <p:extLst>
       <p:ext uri="{BB962C8B-B14F-4D97-AF65-F5344CB8AC3E}">
-        <p14:creationId xmlns:p14="http://schemas.microsoft.com/office/powerpoint/2010/main" val="2630643345"/>
+        <p14:creationId xmlns:p14="http://schemas.microsoft.com/office/powerpoint/2010/main" val="599695841"/>
       </p:ext>
     </p:extLst>
   </p:cSld>
@@ -14098,6 +14286,15 @@
 </file>
 
 <file path=customXml/item1.xml><?xml version="1.0" encoding="utf-8"?>
+<?mso-contentType ?>
+<FormTemplates xmlns="http://schemas.microsoft.com/sharepoint/v3/contenttype/forms">
+  <Display>DocumentLibraryForm</Display>
+  <Edit>AssetEditForm</Edit>
+  <New>DocumentLibraryForm</New>
+</FormTemplates>
+</file>
+
+<file path=customXml/item2.xml><?xml version="1.0" encoding="utf-8"?>
 <p:properties xmlns:p="http://schemas.microsoft.com/office/2006/metadata/properties" xmlns:xsi="http://www.w3.org/2001/XMLSchema-instance" xmlns:pc="http://schemas.microsoft.com/office/infopath/2007/PartnerControls">
   <documentManagement>
     <APDescription xmlns="4873beb7-5857-4685-be1f-d57550cc96cc" xsi:nil="true"/>
@@ -14221,15 +14418,6 @@
     <UANotes xmlns="4873beb7-5857-4685-be1f-d57550cc96cc" xsi:nil="true"/>
   </documentManagement>
 </p:properties>
-</file>
-
-<file path=customXml/item2.xml><?xml version="1.0" encoding="utf-8"?>
-<?mso-contentType ?>
-<FormTemplates xmlns="http://schemas.microsoft.com/sharepoint/v3/contenttype/forms">
-  <Display>DocumentLibraryForm</Display>
-  <Edit>AssetEditForm</Edit>
-  <New>DocumentLibraryForm</New>
-</FormTemplates>
 </file>
 
 <file path=customXml/item3.xml><?xml version="1.0" encoding="utf-8"?>
@@ -15273,6 +15461,14 @@
 </file>
 
 <file path=customXml/itemProps1.xml><?xml version="1.0" encoding="utf-8"?>
+<ds:datastoreItem xmlns:ds="http://schemas.openxmlformats.org/officeDocument/2006/customXml" ds:itemID="{100AC149-8447-4BE5-88C7-DBE24EA73E83}">
+  <ds:schemaRefs>
+    <ds:schemaRef ds:uri="http://schemas.microsoft.com/sharepoint/v3/contenttype/forms"/>
+  </ds:schemaRefs>
+</ds:datastoreItem>
+</file>
+
+<file path=customXml/itemProps2.xml><?xml version="1.0" encoding="utf-8"?>
 <ds:datastoreItem xmlns:ds="http://schemas.openxmlformats.org/officeDocument/2006/customXml" ds:itemID="{D0D1C9B0-FE26-433B-8E1A-54CCDFA4EB1D}">
   <ds:schemaRefs>
     <ds:schemaRef ds:uri="http://schemas.microsoft.com/office/infopath/2007/PartnerControls"/>
@@ -15284,14 +15480,6 @@
     <ds:schemaRef ds:uri="http://purl.org/dc/elements/1.1/"/>
     <ds:schemaRef ds:uri="http://schemas.openxmlformats.org/package/2006/metadata/core-properties"/>
     <ds:schemaRef ds:uri="http://purl.org/dc/dcmitype/"/>
-  </ds:schemaRefs>
-</ds:datastoreItem>
-</file>
-
-<file path=customXml/itemProps2.xml><?xml version="1.0" encoding="utf-8"?>
-<ds:datastoreItem xmlns:ds="http://schemas.openxmlformats.org/officeDocument/2006/customXml" ds:itemID="{100AC149-8447-4BE5-88C7-DBE24EA73E83}">
-  <ds:schemaRefs>
-    <ds:schemaRef ds:uri="http://schemas.microsoft.com/sharepoint/v3/contenttype/forms"/>
   </ds:schemaRefs>
 </ds:datastoreItem>
 </file>

</xml_diff>